<commit_message>
Updates to the presentations on initialization and type conversions.
</commit_message>
<xml_diff>
--- a/Presentations/Initialization.pptx
+++ b/Presentations/Initialization.pptx
@@ -24,14 +24,15 @@
     <p:sldId id="272" r:id="rId18"/>
     <p:sldId id="273" r:id="rId19"/>
     <p:sldId id="274" r:id="rId20"/>
-    <p:sldId id="275" r:id="rId21"/>
-    <p:sldId id="276" r:id="rId22"/>
-    <p:sldId id="277" r:id="rId23"/>
-    <p:sldId id="278" r:id="rId24"/>
-    <p:sldId id="279" r:id="rId25"/>
-    <p:sldId id="280" r:id="rId26"/>
-    <p:sldId id="281" r:id="rId27"/>
-    <p:sldId id="282" r:id="rId28"/>
+    <p:sldId id="283" r:id="rId21"/>
+    <p:sldId id="275" r:id="rId22"/>
+    <p:sldId id="276" r:id="rId23"/>
+    <p:sldId id="277" r:id="rId24"/>
+    <p:sldId id="278" r:id="rId25"/>
+    <p:sldId id="279" r:id="rId26"/>
+    <p:sldId id="280" r:id="rId27"/>
+    <p:sldId id="281" r:id="rId28"/>
+    <p:sldId id="282" r:id="rId29"/>
   </p:sldIdLst>
   <p:sldSz cx="12192000" cy="6858000"/>
   <p:notesSz cx="6858000" cy="9144000"/>
@@ -285,7 +286,7 @@
           <a:p>
             <a:fld id="{6A41A0DB-9B59-410A-A8C9-128A3CF2E3AE}" type="datetimeFigureOut">
               <a:rPr lang="en-US" smtClean="0"/>
-              <a:t>8/31/23</a:t>
+              <a:t>9/14/23</a:t>
             </a:fld>
             <a:endParaRPr lang="en-US"/>
           </a:p>
@@ -483,7 +484,7 @@
           <a:p>
             <a:fld id="{6A41A0DB-9B59-410A-A8C9-128A3CF2E3AE}" type="datetimeFigureOut">
               <a:rPr lang="en-US" smtClean="0"/>
-              <a:t>8/31/23</a:t>
+              <a:t>9/14/23</a:t>
             </a:fld>
             <a:endParaRPr lang="en-US"/>
           </a:p>
@@ -691,7 +692,7 @@
           <a:p>
             <a:fld id="{6A41A0DB-9B59-410A-A8C9-128A3CF2E3AE}" type="datetimeFigureOut">
               <a:rPr lang="en-US" smtClean="0"/>
-              <a:t>8/31/23</a:t>
+              <a:t>9/14/23</a:t>
             </a:fld>
             <a:endParaRPr lang="en-US"/>
           </a:p>
@@ -889,7 +890,7 @@
           <a:p>
             <a:fld id="{6A41A0DB-9B59-410A-A8C9-128A3CF2E3AE}" type="datetimeFigureOut">
               <a:rPr lang="en-US" smtClean="0"/>
-              <a:t>8/31/23</a:t>
+              <a:t>9/14/23</a:t>
             </a:fld>
             <a:endParaRPr lang="en-US"/>
           </a:p>
@@ -1164,7 +1165,7 @@
           <a:p>
             <a:fld id="{6A41A0DB-9B59-410A-A8C9-128A3CF2E3AE}" type="datetimeFigureOut">
               <a:rPr lang="en-US" smtClean="0"/>
-              <a:t>8/31/23</a:t>
+              <a:t>9/14/23</a:t>
             </a:fld>
             <a:endParaRPr lang="en-US"/>
           </a:p>
@@ -1429,7 +1430,7 @@
           <a:p>
             <a:fld id="{6A41A0DB-9B59-410A-A8C9-128A3CF2E3AE}" type="datetimeFigureOut">
               <a:rPr lang="en-US" smtClean="0"/>
-              <a:t>8/31/23</a:t>
+              <a:t>9/14/23</a:t>
             </a:fld>
             <a:endParaRPr lang="en-US"/>
           </a:p>
@@ -1841,7 +1842,7 @@
           <a:p>
             <a:fld id="{6A41A0DB-9B59-410A-A8C9-128A3CF2E3AE}" type="datetimeFigureOut">
               <a:rPr lang="en-US" smtClean="0"/>
-              <a:t>8/31/23</a:t>
+              <a:t>9/14/23</a:t>
             </a:fld>
             <a:endParaRPr lang="en-US"/>
           </a:p>
@@ -1982,7 +1983,7 @@
           <a:p>
             <a:fld id="{6A41A0DB-9B59-410A-A8C9-128A3CF2E3AE}" type="datetimeFigureOut">
               <a:rPr lang="en-US" smtClean="0"/>
-              <a:t>8/31/23</a:t>
+              <a:t>9/14/23</a:t>
             </a:fld>
             <a:endParaRPr lang="en-US"/>
           </a:p>
@@ -2095,7 +2096,7 @@
           <a:p>
             <a:fld id="{6A41A0DB-9B59-410A-A8C9-128A3CF2E3AE}" type="datetimeFigureOut">
               <a:rPr lang="en-US" smtClean="0"/>
-              <a:t>8/31/23</a:t>
+              <a:t>9/14/23</a:t>
             </a:fld>
             <a:endParaRPr lang="en-US"/>
           </a:p>
@@ -2406,7 +2407,7 @@
           <a:p>
             <a:fld id="{6A41A0DB-9B59-410A-A8C9-128A3CF2E3AE}" type="datetimeFigureOut">
               <a:rPr lang="en-US" smtClean="0"/>
-              <a:t>8/31/23</a:t>
+              <a:t>9/14/23</a:t>
             </a:fld>
             <a:endParaRPr lang="en-US"/>
           </a:p>
@@ -2694,7 +2695,7 @@
           <a:p>
             <a:fld id="{6A41A0DB-9B59-410A-A8C9-128A3CF2E3AE}" type="datetimeFigureOut">
               <a:rPr lang="en-US" smtClean="0"/>
-              <a:t>8/31/23</a:t>
+              <a:t>9/14/23</a:t>
             </a:fld>
             <a:endParaRPr lang="en-US"/>
           </a:p>
@@ -2935,7 +2936,7 @@
           <a:p>
             <a:fld id="{6A41A0DB-9B59-410A-A8C9-128A3CF2E3AE}" type="datetimeFigureOut">
               <a:rPr lang="en-US" smtClean="0"/>
-              <a:t>8/31/23</a:t>
+              <a:t>9/14/23</a:t>
             </a:fld>
             <a:endParaRPr lang="en-US"/>
           </a:p>
@@ -3553,7 +3554,7 @@
           <a:p>
             <a:r>
               <a:rPr lang="en-US" dirty="0"/>
-              <a:t>This is less confusing in practice than it seems.</a:t>
+              <a:t>This tends to be less confusing in practice than it sounds.</a:t>
             </a:r>
           </a:p>
         </p:txBody>
@@ -3903,7 +3904,15 @@
             </a:r>
             <a:r>
               <a:rPr lang="en-US" dirty="0"/>
-              <a:t> is a (raw) pointer that points at the dynamically allocated object.</a:t>
+              <a:t> is a </a:t>
+            </a:r>
+            <a:r>
+              <a:rPr lang="en-US" i="1" dirty="0"/>
+              <a:t>raw</a:t>
+            </a:r>
+            <a:r>
+              <a:rPr lang="en-US" dirty="0"/>
+              <a:t> pointer that points at the dynamically allocated object.</a:t>
             </a:r>
           </a:p>
           <a:p>
@@ -4777,7 +4786,7 @@
           <a:p>
             <a:r>
               <a:rPr lang="en-US" dirty="0"/>
-              <a:t>The compiler generates temporaries to hold explicitly constructed objects (usually… sometimes they can be removed by optimizations).</a:t>
+              <a:t>The compiler generates temporaries to hold explicitly constructed objects (although sometimes they can be removed by optimizations).</a:t>
             </a:r>
           </a:p>
         </p:txBody>
@@ -5271,7 +5280,15 @@
           <a:p>
             <a:r>
               <a:rPr lang="en-US" dirty="0"/>
-              <a:t>If a class has a constructor that can be called with one argument…</a:t>
+              <a:t>If a class has a constructor that </a:t>
+            </a:r>
+            <a:r>
+              <a:rPr lang="en-US" i="1" dirty="0"/>
+              <a:t>can be called with one argument</a:t>
+            </a:r>
+            <a:r>
+              <a:rPr lang="en-US" dirty="0"/>
+              <a:t>…</a:t>
             </a:r>
           </a:p>
           <a:p>
@@ -5754,17 +5771,17 @@
             </a:r>
           </a:p>
           <a:p>
+            <a:pPr lvl="2"/>
+            <a:r>
+              <a:rPr lang="en-US" dirty="0"/>
+              <a:t>(global variables can only have constant expressions as initializers)</a:t>
+            </a:r>
+          </a:p>
+          <a:p>
             <a:pPr lvl="1"/>
             <a:r>
               <a:rPr lang="en-US" dirty="0"/>
-              <a:t>… global variables can only have constant expressions as initializers.</a:t>
-            </a:r>
-          </a:p>
-          <a:p>
-            <a:pPr lvl="1"/>
-            <a:r>
-              <a:rPr lang="en-US" dirty="0"/>
-              <a:t>… local variables have “unspecified” initial values.</a:t>
+              <a:t>… local variables have indeterminate initial values.</a:t>
             </a:r>
           </a:p>
         </p:txBody>
@@ -5864,7 +5881,7 @@
         <p:spPr>
           <a:xfrm>
             <a:off x="6847199" y="3401359"/>
-            <a:ext cx="1045094" cy="369332"/>
+            <a:ext cx="2018694" cy="369332"/>
           </a:xfrm>
           <a:prstGeom prst="rect">
             <a:avLst/>
@@ -5879,7 +5896,7 @@
           <a:p>
             <a:r>
               <a:rPr lang="en-US" dirty="0"/>
-              <a:t>Initializer</a:t>
+              <a:t>Initializer (optional)</a:t>
             </a:r>
           </a:p>
         </p:txBody>
@@ -5943,7 +5960,84 @@
         <p:spPr>
           <a:xfrm flipH="1" flipV="1">
             <a:off x="7070103" y="3037804"/>
-            <a:ext cx="299643" cy="363555"/>
+            <a:ext cx="786443" cy="363555"/>
+          </a:xfrm>
+          <a:prstGeom prst="straightConnector1">
+            <a:avLst/>
+          </a:prstGeom>
+          <a:ln>
+            <a:tailEnd type="triangle"/>
+          </a:ln>
+        </p:spPr>
+        <p:style>
+          <a:lnRef idx="1">
+            <a:schemeClr val="accent1"/>
+          </a:lnRef>
+          <a:fillRef idx="0">
+            <a:schemeClr val="accent1"/>
+          </a:fillRef>
+          <a:effectRef idx="0">
+            <a:schemeClr val="accent1"/>
+          </a:effectRef>
+          <a:fontRef idx="minor">
+            <a:schemeClr val="tx1"/>
+          </a:fontRef>
+        </p:style>
+      </p:cxnSp>
+      <p:sp>
+        <p:nvSpPr>
+          <p:cNvPr id="7" name="TextBox 6">
+            <a:extLst>
+              <a:ext uri="{FF2B5EF4-FFF2-40B4-BE49-F238E27FC236}">
+                <a16:creationId xmlns:a16="http://schemas.microsoft.com/office/drawing/2014/main" id="{BA2E664E-E902-5809-C43F-E4A7DA163C16}"/>
+              </a:ext>
+            </a:extLst>
+          </p:cNvPr>
+          <p:cNvSpPr txBox="1"/>
+          <p:nvPr/>
+        </p:nvSpPr>
+        <p:spPr>
+          <a:xfrm>
+            <a:off x="2884714" y="2650461"/>
+            <a:ext cx="1477456" cy="369332"/>
+          </a:xfrm>
+          <a:prstGeom prst="rect">
+            <a:avLst/>
+          </a:prstGeom>
+          <a:noFill/>
+        </p:spPr>
+        <p:txBody>
+          <a:bodyPr wrap="none" rtlCol="0">
+            <a:spAutoFit/>
+          </a:bodyPr>
+          <a:lstStyle/>
+          <a:p>
+            <a:r>
+              <a:rPr lang="en-US" dirty="0"/>
+              <a:t>Type specifier</a:t>
+            </a:r>
+          </a:p>
+        </p:txBody>
+      </p:sp>
+      <p:cxnSp>
+        <p:nvCxnSpPr>
+          <p:cNvPr id="11" name="Straight Arrow Connector 10">
+            <a:extLst>
+              <a:ext uri="{FF2B5EF4-FFF2-40B4-BE49-F238E27FC236}">
+                <a16:creationId xmlns:a16="http://schemas.microsoft.com/office/drawing/2014/main" id="{24C7FBCA-FDF7-60DD-625F-36DB2E361E85}"/>
+              </a:ext>
+            </a:extLst>
+          </p:cNvPr>
+          <p:cNvCxnSpPr>
+            <a:stCxn id="7" idx="3"/>
+            <a:endCxn id="4" idx="1"/>
+          </p:cNvCxnSpPr>
+          <p:nvPr/>
+        </p:nvCxnSpPr>
+        <p:spPr>
+          <a:xfrm>
+            <a:off x="4362170" y="2835127"/>
+            <a:ext cx="460084" cy="0"/>
           </a:xfrm>
           <a:prstGeom prst="straightConnector1">
             <a:avLst/>
@@ -6002,7 +6096,7 @@
           <p:cNvPr id="2" name="Title 1">
             <a:extLst>
               <a:ext uri="{FF2B5EF4-FFF2-40B4-BE49-F238E27FC236}">
-                <a16:creationId xmlns:a16="http://schemas.microsoft.com/office/drawing/2014/main" id="{A51E8449-AB21-4EDC-96F7-2F3661200253}"/>
+                <a16:creationId xmlns:a16="http://schemas.microsoft.com/office/drawing/2014/main" id="{3D8FCADE-9398-49ED-8F6F-72AF98C9B3DA}"/>
               </a:ext>
             </a:extLst>
           </p:cNvPr>
@@ -6020,7 +6114,7 @@
           <a:p>
             <a:r>
               <a:rPr lang="en-US" dirty="0"/>
-              <a:t>Where We Are</a:t>
+              <a:t>Implicit Type Conversion (and by the way…)</a:t>
             </a:r>
           </a:p>
         </p:txBody>
@@ -6030,7 +6124,7 @@
           <p:cNvPr id="3" name="Content Placeholder 2">
             <a:extLst>
               <a:ext uri="{FF2B5EF4-FFF2-40B4-BE49-F238E27FC236}">
-                <a16:creationId xmlns:a16="http://schemas.microsoft.com/office/drawing/2014/main" id="{FC32CC47-08AA-428A-85F9-7004DF3EDAEE}"/>
+                <a16:creationId xmlns:a16="http://schemas.microsoft.com/office/drawing/2014/main" id="{8D8EC83E-C19A-4556-B719-BD3137BC3B9F}"/>
               </a:ext>
             </a:extLst>
           </p:cNvPr>
@@ -6043,20 +6137,12 @@
         </p:nvSpPr>
         <p:spPr/>
         <p:txBody>
-          <a:bodyPr>
-            <a:normAutofit/>
-          </a:bodyPr>
-          <a:lstStyle/>
-          <a:p>
-            <a:r>
-              <a:rPr lang="en-US" dirty="0"/>
-              <a:t>Everything I’ve shown so far works in C++ 1998.</a:t>
-            </a:r>
-          </a:p>
-          <a:p>
-            <a:r>
-              <a:rPr lang="en-US" dirty="0"/>
-              <a:t>But there is still an issue with initializer lists for aggregate objects. Here is the C++ 1998 way to initialize a vector of 10 elements:</a:t>
+          <a:bodyPr/>
+          <a:lstStyle/>
+          <a:p>
+            <a:r>
+              <a:rPr lang="en-US" dirty="0"/>
+              <a:t>This same idea allows you to do something like this:</a:t>
             </a:r>
             <a:br>
               <a:rPr lang="en-US" dirty="0"/>
@@ -6073,21 +6159,14 @@
             <a:br>
               <a:rPr lang="en-US" dirty="0"/>
             </a:br>
+            <a:br>
+              <a:rPr lang="en-US" dirty="0"/>
+            </a:br>
+            <a:br>
+              <a:rPr lang="en-US" dirty="0"/>
+            </a:br>
             <a:endParaRPr lang="en-US" dirty="0"/>
           </a:p>
-          <a:p>
-            <a:r>
-              <a:rPr lang="en-US" dirty="0"/>
-              <a:t>Gross!</a:t>
-            </a:r>
-          </a:p>
-          <a:p>
-            <a:pPr lvl="1"/>
-            <a:r>
-              <a:rPr lang="en-US" dirty="0"/>
-              <a:t>(obviously)</a:t>
-            </a:r>
-          </a:p>
         </p:txBody>
       </p:sp>
       <p:sp>
@@ -6095,7 +6174,7 @@
           <p:cNvPr id="4" name="TextBox 3">
             <a:extLst>
               <a:ext uri="{FF2B5EF4-FFF2-40B4-BE49-F238E27FC236}">
-                <a16:creationId xmlns:a16="http://schemas.microsoft.com/office/drawing/2014/main" id="{E951F5D0-91AC-4BF7-AAD6-885485CA9B9A}"/>
+                <a16:creationId xmlns:a16="http://schemas.microsoft.com/office/drawing/2014/main" id="{1ED7C6B4-9145-4BF3-9243-30DE6AA541C6}"/>
               </a:ext>
             </a:extLst>
           </p:cNvPr>
@@ -6104,8 +6183,8 @@
         </p:nvSpPr>
         <p:spPr>
           <a:xfrm>
-            <a:off x="838200" y="3243942"/>
-            <a:ext cx="10033516" cy="1938992"/>
+            <a:off x="838200" y="2507530"/>
+            <a:ext cx="7904728" cy="2031325"/>
           </a:xfrm>
           <a:prstGeom prst="rect">
             <a:avLst/>
@@ -6119,131 +6198,277 @@
           <a:lstStyle/>
           <a:p>
             <a:r>
-              <a:rPr lang="en-US" sz="2000" dirty="0">
-                <a:latin typeface="Courier New" panose="02070309020205020404" pitchFamily="49" charset="0"/>
-                <a:cs typeface="Courier New" panose="02070309020205020404" pitchFamily="49" charset="0"/>
-              </a:rPr>
-              <a:t>// The initial values:</a:t>
-            </a:r>
-          </a:p>
-          <a:p>
-            <a:r>
-              <a:rPr lang="en-US" sz="2000" b="1" dirty="0">
-                <a:latin typeface="Courier New" panose="02070309020205020404" pitchFamily="49" charset="0"/>
-                <a:cs typeface="Courier New" panose="02070309020205020404" pitchFamily="49" charset="0"/>
-              </a:rPr>
-              <a:t>int</a:t>
-            </a:r>
-            <a:r>
-              <a:rPr lang="en-US" sz="2000" dirty="0">
+              <a:rPr lang="en-US" dirty="0">
+                <a:latin typeface="Courier New" panose="02070309020205020404" pitchFamily="49" charset="0"/>
+                <a:cs typeface="Courier New" panose="02070309020205020404" pitchFamily="49" charset="0"/>
+              </a:rPr>
+              <a:t>// Declaration of a function (probably in a header file)</a:t>
+            </a:r>
+          </a:p>
+          <a:p>
+            <a:r>
+              <a:rPr lang="en-US" b="1" dirty="0">
+                <a:latin typeface="Courier New" panose="02070309020205020404" pitchFamily="49" charset="0"/>
+                <a:cs typeface="Courier New" panose="02070309020205020404" pitchFamily="49" charset="0"/>
+              </a:rPr>
+              <a:t>void</a:t>
+            </a:r>
+            <a:r>
+              <a:rPr lang="en-US" dirty="0">
                 <a:latin typeface="Courier New" panose="02070309020205020404" pitchFamily="49" charset="0"/>
                 <a:cs typeface="Courier New" panose="02070309020205020404" pitchFamily="49" charset="0"/>
               </a:rPr>
               <a:t> </a:t>
             </a:r>
             <a:r>
-              <a:rPr lang="en-US" sz="2000" dirty="0" err="1">
-                <a:latin typeface="Courier New" panose="02070309020205020404" pitchFamily="49" charset="0"/>
-                <a:cs typeface="Courier New" panose="02070309020205020404" pitchFamily="49" charset="0"/>
-              </a:rPr>
-              <a:t>initial_primes</a:t>
-            </a:r>
-            <a:r>
-              <a:rPr lang="en-US" sz="2000" dirty="0">
-                <a:latin typeface="Courier New" panose="02070309020205020404" pitchFamily="49" charset="0"/>
-                <a:cs typeface="Courier New" panose="02070309020205020404" pitchFamily="49" charset="0"/>
-              </a:rPr>
-              <a:t>[10] = { 2, 3, 5, 7, 11, 13, 17, 19, 23, 29 };</a:t>
-            </a:r>
-          </a:p>
-          <a:p>
-            <a:endParaRPr lang="en-US" sz="2000" dirty="0">
+              <a:rPr lang="en-US" dirty="0" err="1">
+                <a:latin typeface="Courier New" panose="02070309020205020404" pitchFamily="49" charset="0"/>
+                <a:cs typeface="Courier New" panose="02070309020205020404" pitchFamily="49" charset="0"/>
+              </a:rPr>
+              <a:t>do_something</a:t>
+            </a:r>
+            <a:r>
+              <a:rPr lang="en-US" dirty="0">
+                <a:latin typeface="Courier New" panose="02070309020205020404" pitchFamily="49" charset="0"/>
+                <a:cs typeface="Courier New" panose="02070309020205020404" pitchFamily="49" charset="0"/>
+              </a:rPr>
+              <a:t>( </a:t>
+            </a:r>
+            <a:r>
+              <a:rPr lang="en-US" b="1" strike="sngStrike" dirty="0">
+                <a:latin typeface="Courier New" panose="02070309020205020404" pitchFamily="49" charset="0"/>
+                <a:cs typeface="Courier New" panose="02070309020205020404" pitchFamily="49" charset="0"/>
+              </a:rPr>
+              <a:t>const</a:t>
+            </a:r>
+            <a:r>
+              <a:rPr lang="en-US" dirty="0">
+                <a:latin typeface="Courier New" panose="02070309020205020404" pitchFamily="49" charset="0"/>
+                <a:cs typeface="Courier New" panose="02070309020205020404" pitchFamily="49" charset="0"/>
+              </a:rPr>
+              <a:t> string &amp;text );</a:t>
+            </a:r>
+          </a:p>
+          <a:p>
+            <a:endParaRPr lang="en-US" dirty="0">
               <a:latin typeface="Courier New" panose="02070309020205020404" pitchFamily="49" charset="0"/>
               <a:cs typeface="Courier New" panose="02070309020205020404" pitchFamily="49" charset="0"/>
             </a:endParaRPr>
           </a:p>
           <a:p>
-            <a:r>
-              <a:rPr lang="en-US" sz="2000" dirty="0">
-                <a:latin typeface="Courier New" panose="02070309020205020404" pitchFamily="49" charset="0"/>
-                <a:cs typeface="Courier New" panose="02070309020205020404" pitchFamily="49" charset="0"/>
-              </a:rPr>
-              <a:t>// Create the vector and copy the initial values into it.</a:t>
-            </a:r>
-          </a:p>
-          <a:p>
-            <a:r>
-              <a:rPr lang="en-US" sz="2000" dirty="0">
-                <a:latin typeface="Courier New" panose="02070309020205020404" pitchFamily="49" charset="0"/>
-                <a:cs typeface="Courier New" panose="02070309020205020404" pitchFamily="49" charset="0"/>
-              </a:rPr>
-              <a:t>vector&lt;</a:t>
-            </a:r>
-            <a:r>
-              <a:rPr lang="en-US" sz="2000" b="1" dirty="0">
-                <a:latin typeface="Courier New" panose="02070309020205020404" pitchFamily="49" charset="0"/>
-                <a:cs typeface="Courier New" panose="02070309020205020404" pitchFamily="49" charset="0"/>
-              </a:rPr>
-              <a:t>int</a:t>
-            </a:r>
-            <a:r>
-              <a:rPr lang="en-US" sz="2000" dirty="0">
-                <a:latin typeface="Courier New" panose="02070309020205020404" pitchFamily="49" charset="0"/>
-                <a:cs typeface="Courier New" panose="02070309020205020404" pitchFamily="49" charset="0"/>
-              </a:rPr>
-              <a:t>&gt; primes( 10 );</a:t>
-            </a:r>
-          </a:p>
-          <a:p>
-            <a:r>
-              <a:rPr lang="en-US" sz="2000" dirty="0" err="1">
-                <a:latin typeface="Courier New" panose="02070309020205020404" pitchFamily="49" charset="0"/>
-                <a:cs typeface="Courier New" panose="02070309020205020404" pitchFamily="49" charset="0"/>
-              </a:rPr>
-              <a:t>primes.insert</a:t>
-            </a:r>
-            <a:r>
-              <a:rPr lang="en-US" sz="2000" dirty="0">
-                <a:latin typeface="Courier New" panose="02070309020205020404" pitchFamily="49" charset="0"/>
-                <a:cs typeface="Courier New" panose="02070309020205020404" pitchFamily="49" charset="0"/>
-              </a:rPr>
-              <a:t>( </a:t>
-            </a:r>
-            <a:r>
-              <a:rPr lang="en-US" sz="2000" dirty="0" err="1">
-                <a:latin typeface="Courier New" panose="02070309020205020404" pitchFamily="49" charset="0"/>
-                <a:cs typeface="Courier New" panose="02070309020205020404" pitchFamily="49" charset="0"/>
-              </a:rPr>
-              <a:t>initial_primes</a:t>
-            </a:r>
-            <a:r>
-              <a:rPr lang="en-US" sz="2000" dirty="0">
-                <a:latin typeface="Courier New" panose="02070309020205020404" pitchFamily="49" charset="0"/>
-                <a:cs typeface="Courier New" panose="02070309020205020404" pitchFamily="49" charset="0"/>
-              </a:rPr>
-              <a:t>, </a:t>
-            </a:r>
-            <a:r>
-              <a:rPr lang="en-US" sz="2000" dirty="0" err="1">
-                <a:latin typeface="Courier New" panose="02070309020205020404" pitchFamily="49" charset="0"/>
-                <a:cs typeface="Courier New" panose="02070309020205020404" pitchFamily="49" charset="0"/>
-              </a:rPr>
-              <a:t>initial_primes</a:t>
-            </a:r>
-            <a:r>
-              <a:rPr lang="en-US" sz="2000" dirty="0">
-                <a:latin typeface="Courier New" panose="02070309020205020404" pitchFamily="49" charset="0"/>
-                <a:cs typeface="Courier New" panose="02070309020205020404" pitchFamily="49" charset="0"/>
-              </a:rPr>
-              <a:t> + 10 );</a:t>
-            </a:r>
-          </a:p>
-        </p:txBody>
-      </p:sp>
+            <a:endParaRPr lang="en-US" dirty="0">
+              <a:latin typeface="Courier New" panose="02070309020205020404" pitchFamily="49" charset="0"/>
+              <a:cs typeface="Courier New" panose="02070309020205020404" pitchFamily="49" charset="0"/>
+            </a:endParaRPr>
+          </a:p>
+          <a:p>
+            <a:r>
+              <a:rPr lang="en-US" dirty="0">
+                <a:latin typeface="Courier New" panose="02070309020205020404" pitchFamily="49" charset="0"/>
+                <a:cs typeface="Courier New" panose="02070309020205020404" pitchFamily="49" charset="0"/>
+              </a:rPr>
+              <a:t>// Create a temporary string from a const char *, etc.</a:t>
+            </a:r>
+          </a:p>
+          <a:p>
+            <a:r>
+              <a:rPr lang="en-US" dirty="0" err="1">
+                <a:latin typeface="Courier New" panose="02070309020205020404" pitchFamily="49" charset="0"/>
+                <a:cs typeface="Courier New" panose="02070309020205020404" pitchFamily="49" charset="0"/>
+              </a:rPr>
+              <a:t>do_something</a:t>
+            </a:r>
+            <a:r>
+              <a:rPr lang="en-US" dirty="0">
+                <a:latin typeface="Courier New" panose="02070309020205020404" pitchFamily="49" charset="0"/>
+                <a:cs typeface="Courier New" panose="02070309020205020404" pitchFamily="49" charset="0"/>
+              </a:rPr>
+              <a:t>( “Jill” );</a:t>
+            </a:r>
+          </a:p>
+          <a:p>
+            <a:endParaRPr lang="en-US" dirty="0"/>
+          </a:p>
+        </p:txBody>
+      </p:sp>
+      <p:sp>
+        <p:nvSpPr>
+          <p:cNvPr id="5" name="TextBox 4">
+            <a:extLst>
+              <a:ext uri="{FF2B5EF4-FFF2-40B4-BE49-F238E27FC236}">
+                <a16:creationId xmlns:a16="http://schemas.microsoft.com/office/drawing/2014/main" id="{C6A494D1-AF56-F6BC-D1F0-1ADFFFA61F69}"/>
+              </a:ext>
+            </a:extLst>
+          </p:cNvPr>
+          <p:cNvSpPr txBox="1"/>
+          <p:nvPr/>
+        </p:nvSpPr>
+        <p:spPr>
+          <a:xfrm>
+            <a:off x="4953001" y="4218854"/>
+            <a:ext cx="2691314" cy="369332"/>
+          </a:xfrm>
+          <a:prstGeom prst="rect">
+            <a:avLst/>
+          </a:prstGeom>
+          <a:noFill/>
+        </p:spPr>
+        <p:txBody>
+          <a:bodyPr wrap="none" rtlCol="0">
+            <a:spAutoFit/>
+          </a:bodyPr>
+          <a:lstStyle/>
+          <a:p>
+            <a:r>
+              <a:rPr lang="en-US" dirty="0"/>
+              <a:t>If you remove </a:t>
+            </a:r>
+            <a:r>
+              <a:rPr lang="en-US" b="1" dirty="0"/>
+              <a:t>const</a:t>
+            </a:r>
+            <a:r>
+              <a:rPr lang="en-US" dirty="0"/>
+              <a:t> here…</a:t>
+            </a:r>
+          </a:p>
+        </p:txBody>
+      </p:sp>
+      <p:sp>
+        <p:nvSpPr>
+          <p:cNvPr id="6" name="TextBox 5">
+            <a:extLst>
+              <a:ext uri="{FF2B5EF4-FFF2-40B4-BE49-F238E27FC236}">
+                <a16:creationId xmlns:a16="http://schemas.microsoft.com/office/drawing/2014/main" id="{6B40DF24-045E-853A-DBFA-794EB12BC497}"/>
+              </a:ext>
+            </a:extLst>
+          </p:cNvPr>
+          <p:cNvSpPr txBox="1"/>
+          <p:nvPr/>
+        </p:nvSpPr>
+        <p:spPr>
+          <a:xfrm>
+            <a:off x="3799114" y="4897594"/>
+            <a:ext cx="6470746" cy="646331"/>
+          </a:xfrm>
+          <a:prstGeom prst="rect">
+            <a:avLst/>
+          </a:prstGeom>
+          <a:noFill/>
+        </p:spPr>
+        <p:txBody>
+          <a:bodyPr wrap="none" rtlCol="0">
+            <a:spAutoFit/>
+          </a:bodyPr>
+          <a:lstStyle/>
+          <a:p>
+            <a:r>
+              <a:rPr lang="en-US" dirty="0"/>
+              <a:t>… this is an </a:t>
+            </a:r>
+            <a:r>
+              <a:rPr lang="en-US" u="sng" dirty="0"/>
+              <a:t>error</a:t>
+            </a:r>
+            <a:r>
+              <a:rPr lang="en-US" dirty="0"/>
+              <a:t>!</a:t>
+            </a:r>
+          </a:p>
+          <a:p>
+            <a:r>
+              <a:rPr lang="en-US" dirty="0"/>
+              <a:t>The compiler won’t bind a reference to non-const to a temporary!</a:t>
+            </a:r>
+          </a:p>
+        </p:txBody>
+      </p:sp>
+      <p:cxnSp>
+        <p:nvCxnSpPr>
+          <p:cNvPr id="8" name="Straight Arrow Connector 7">
+            <a:extLst>
+              <a:ext uri="{FF2B5EF4-FFF2-40B4-BE49-F238E27FC236}">
+                <a16:creationId xmlns:a16="http://schemas.microsoft.com/office/drawing/2014/main" id="{699D68DE-74DA-7CD5-EE17-BC9513BF8F0D}"/>
+              </a:ext>
+            </a:extLst>
+          </p:cNvPr>
+          <p:cNvCxnSpPr>
+            <a:stCxn id="5" idx="1"/>
+          </p:cNvCxnSpPr>
+          <p:nvPr/>
+        </p:nvCxnSpPr>
+        <p:spPr>
+          <a:xfrm flipH="1" flipV="1">
+            <a:off x="4082143" y="3135086"/>
+            <a:ext cx="870858" cy="1268434"/>
+          </a:xfrm>
+          <a:prstGeom prst="straightConnector1">
+            <a:avLst/>
+          </a:prstGeom>
+          <a:ln>
+            <a:tailEnd type="triangle"/>
+          </a:ln>
+        </p:spPr>
+        <p:style>
+          <a:lnRef idx="1">
+            <a:schemeClr val="accent1"/>
+          </a:lnRef>
+          <a:fillRef idx="0">
+            <a:schemeClr val="accent1"/>
+          </a:fillRef>
+          <a:effectRef idx="0">
+            <a:schemeClr val="accent1"/>
+          </a:effectRef>
+          <a:fontRef idx="minor">
+            <a:schemeClr val="tx1"/>
+          </a:fontRef>
+        </p:style>
+      </p:cxnSp>
+      <p:cxnSp>
+        <p:nvCxnSpPr>
+          <p:cNvPr id="10" name="Straight Arrow Connector 9">
+            <a:extLst>
+              <a:ext uri="{FF2B5EF4-FFF2-40B4-BE49-F238E27FC236}">
+                <a16:creationId xmlns:a16="http://schemas.microsoft.com/office/drawing/2014/main" id="{25E1A207-AFAC-2C89-C4AA-B6EAAE4712BB}"/>
+              </a:ext>
+            </a:extLst>
+          </p:cNvPr>
+          <p:cNvCxnSpPr>
+            <a:stCxn id="6" idx="1"/>
+          </p:cNvCxnSpPr>
+          <p:nvPr/>
+        </p:nvCxnSpPr>
+        <p:spPr>
+          <a:xfrm flipH="1" flipV="1">
+            <a:off x="3374571" y="4218854"/>
+            <a:ext cx="424543" cy="1001906"/>
+          </a:xfrm>
+          <a:prstGeom prst="straightConnector1">
+            <a:avLst/>
+          </a:prstGeom>
+          <a:ln>
+            <a:tailEnd type="triangle"/>
+          </a:ln>
+        </p:spPr>
+        <p:style>
+          <a:lnRef idx="1">
+            <a:schemeClr val="accent1"/>
+          </a:lnRef>
+          <a:fillRef idx="0">
+            <a:schemeClr val="accent1"/>
+          </a:fillRef>
+          <a:effectRef idx="0">
+            <a:schemeClr val="accent1"/>
+          </a:effectRef>
+          <a:fontRef idx="minor">
+            <a:schemeClr val="tx1"/>
+          </a:fontRef>
+        </p:style>
+      </p:cxnSp>
     </p:spTree>
     <p:extLst>
       <p:ext uri="{BB962C8B-B14F-4D97-AF65-F5344CB8AC3E}">
-        <p14:creationId xmlns:p14="http://schemas.microsoft.com/office/powerpoint/2010/main" val="1741876361"/>
+        <p14:creationId xmlns:p14="http://schemas.microsoft.com/office/powerpoint/2010/main" val="1643007045"/>
       </p:ext>
     </p:extLst>
   </p:cSld>
@@ -6275,7 +6500,7 @@
           <p:cNvPr id="2" name="Title 1">
             <a:extLst>
               <a:ext uri="{FF2B5EF4-FFF2-40B4-BE49-F238E27FC236}">
-                <a16:creationId xmlns:a16="http://schemas.microsoft.com/office/drawing/2014/main" id="{1CE6A15F-50FD-4A28-99F8-184F5F1528CD}"/>
+                <a16:creationId xmlns:a16="http://schemas.microsoft.com/office/drawing/2014/main" id="{A51E8449-AB21-4EDC-96F7-2F3661200253}"/>
               </a:ext>
             </a:extLst>
           </p:cNvPr>
@@ -6293,7 +6518,7 @@
           <a:p>
             <a:r>
               <a:rPr lang="en-US" dirty="0"/>
-              <a:t>C++ 2011 Initializer List Constructors</a:t>
+              <a:t>Where We Are</a:t>
             </a:r>
           </a:p>
         </p:txBody>
@@ -6303,7 +6528,7 @@
           <p:cNvPr id="3" name="Content Placeholder 2">
             <a:extLst>
               <a:ext uri="{FF2B5EF4-FFF2-40B4-BE49-F238E27FC236}">
-                <a16:creationId xmlns:a16="http://schemas.microsoft.com/office/drawing/2014/main" id="{00F5E8A9-86B2-49DD-9E5E-BB90A22C4D1A}"/>
+                <a16:creationId xmlns:a16="http://schemas.microsoft.com/office/drawing/2014/main" id="{FC32CC47-08AA-428A-85F9-7004DF3EDAEE}"/>
               </a:ext>
             </a:extLst>
           </p:cNvPr>
@@ -6316,33 +6541,20 @@
         </p:nvSpPr>
         <p:spPr/>
         <p:txBody>
-          <a:bodyPr/>
-          <a:lstStyle/>
-          <a:p>
-            <a:r>
-              <a:rPr lang="en-US" dirty="0"/>
-              <a:t>In C++ 2011 this matter is fixed.</a:t>
-            </a:r>
-          </a:p>
-          <a:p>
-            <a:pPr lvl="1"/>
-            <a:r>
-              <a:rPr lang="en-US" dirty="0"/>
-              <a:t>A special “initializer list” class is defined in the library.</a:t>
-            </a:r>
-          </a:p>
-          <a:p>
-            <a:pPr lvl="1"/>
-            <a:r>
-              <a:rPr lang="en-US" dirty="0"/>
-              <a:t>Class designers can provide an “initializer list constructor” that takes an instance of the initializer list class.</a:t>
-            </a:r>
-          </a:p>
-          <a:p>
-            <a:pPr lvl="1"/>
-            <a:r>
-              <a:rPr lang="en-US" dirty="0"/>
-              <a:t>When the compiler sees the programmer using an initializer list, it calls that constructor (if the initializer list constructor does not exist, it is an error).</a:t>
+          <a:bodyPr>
+            <a:normAutofit/>
+          </a:bodyPr>
+          <a:lstStyle/>
+          <a:p>
+            <a:r>
+              <a:rPr lang="en-US" dirty="0"/>
+              <a:t>Everything I’ve shown so far works in C++ 1998.</a:t>
+            </a:r>
+          </a:p>
+          <a:p>
+            <a:r>
+              <a:rPr lang="en-US" dirty="0"/>
+              <a:t>But there is still an issue with initializer lists for aggregate objects. Here is the C++ 1998 way to initialize a vector of 10 elements:</a:t>
             </a:r>
             <a:br>
               <a:rPr lang="en-US" dirty="0"/>
@@ -6350,30 +6562,28 @@
             <a:br>
               <a:rPr lang="en-US" dirty="0"/>
             </a:br>
+            <a:br>
+              <a:rPr lang="en-US" dirty="0"/>
+            </a:br>
+            <a:br>
+              <a:rPr lang="en-US" dirty="0"/>
+            </a:br>
+            <a:br>
+              <a:rPr lang="en-US" dirty="0"/>
+            </a:br>
             <a:endParaRPr lang="en-US" dirty="0"/>
           </a:p>
           <a:p>
             <a:r>
-              <a:rPr lang="en-US" dirty="0" err="1"/>
-              <a:t>Ahhh</a:t>
-            </a:r>
-            <a:r>
-              <a:rPr lang="en-US" dirty="0"/>
-              <a:t>… much better.</a:t>
-            </a:r>
-          </a:p>
-          <a:p>
-            <a:r>
-              <a:rPr lang="en-US" dirty="0"/>
-              <a:t>All C++ 2011 standard containers do this. </a:t>
-            </a:r>
-            <a:r>
-              <a:rPr lang="en-US" i="1" dirty="0"/>
-              <a:t>You can in your classes too</a:t>
-            </a:r>
-            <a:r>
-              <a:rPr lang="en-US" dirty="0"/>
-              <a:t>!</a:t>
+              <a:rPr lang="en-US" dirty="0"/>
+              <a:t>Gross!</a:t>
+            </a:r>
+          </a:p>
+          <a:p>
+            <a:pPr lvl="1"/>
+            <a:r>
+              <a:rPr lang="en-US" dirty="0"/>
+              <a:t>(obviously)</a:t>
             </a:r>
           </a:p>
         </p:txBody>
@@ -6383,7 +6593,7 @@
           <p:cNvPr id="4" name="TextBox 3">
             <a:extLst>
               <a:ext uri="{FF2B5EF4-FFF2-40B4-BE49-F238E27FC236}">
-                <a16:creationId xmlns:a16="http://schemas.microsoft.com/office/drawing/2014/main" id="{F14A1C4C-BDD0-4B92-A486-541C3AC8816C}"/>
+                <a16:creationId xmlns:a16="http://schemas.microsoft.com/office/drawing/2014/main" id="{E951F5D0-91AC-4BF7-AAD6-885485CA9B9A}"/>
               </a:ext>
             </a:extLst>
           </p:cNvPr>
@@ -6392,8 +6602,8 @@
         </p:nvSpPr>
         <p:spPr>
           <a:xfrm>
-            <a:off x="838200" y="4326903"/>
-            <a:ext cx="9417963" cy="400110"/>
+            <a:off x="838200" y="3243942"/>
+            <a:ext cx="10033516" cy="1938992"/>
           </a:xfrm>
           <a:prstGeom prst="rect">
             <a:avLst/>
@@ -6411,6 +6621,60 @@
                 <a:latin typeface="Courier New" panose="02070309020205020404" pitchFamily="49" charset="0"/>
                 <a:cs typeface="Courier New" panose="02070309020205020404" pitchFamily="49" charset="0"/>
               </a:rPr>
+              <a:t>// The initial values:</a:t>
+            </a:r>
+          </a:p>
+          <a:p>
+            <a:r>
+              <a:rPr lang="en-US" sz="2000" b="1" dirty="0">
+                <a:latin typeface="Courier New" panose="02070309020205020404" pitchFamily="49" charset="0"/>
+                <a:cs typeface="Courier New" panose="02070309020205020404" pitchFamily="49" charset="0"/>
+              </a:rPr>
+              <a:t>int</a:t>
+            </a:r>
+            <a:r>
+              <a:rPr lang="en-US" sz="2000" dirty="0">
+                <a:latin typeface="Courier New" panose="02070309020205020404" pitchFamily="49" charset="0"/>
+                <a:cs typeface="Courier New" panose="02070309020205020404" pitchFamily="49" charset="0"/>
+              </a:rPr>
+              <a:t> </a:t>
+            </a:r>
+            <a:r>
+              <a:rPr lang="en-US" sz="2000" dirty="0" err="1">
+                <a:latin typeface="Courier New" panose="02070309020205020404" pitchFamily="49" charset="0"/>
+                <a:cs typeface="Courier New" panose="02070309020205020404" pitchFamily="49" charset="0"/>
+              </a:rPr>
+              <a:t>initial_primes</a:t>
+            </a:r>
+            <a:r>
+              <a:rPr lang="en-US" sz="2000" dirty="0">
+                <a:latin typeface="Courier New" panose="02070309020205020404" pitchFamily="49" charset="0"/>
+                <a:cs typeface="Courier New" panose="02070309020205020404" pitchFamily="49" charset="0"/>
+              </a:rPr>
+              <a:t>[10] = { 2, 3, 5, 7, 11, 13, 17, 19, 23, 29 };</a:t>
+            </a:r>
+          </a:p>
+          <a:p>
+            <a:endParaRPr lang="en-US" sz="2000" dirty="0">
+              <a:latin typeface="Courier New" panose="02070309020205020404" pitchFamily="49" charset="0"/>
+              <a:cs typeface="Courier New" panose="02070309020205020404" pitchFamily="49" charset="0"/>
+            </a:endParaRPr>
+          </a:p>
+          <a:p>
+            <a:r>
+              <a:rPr lang="en-US" sz="2000" dirty="0">
+                <a:latin typeface="Courier New" panose="02070309020205020404" pitchFamily="49" charset="0"/>
+                <a:cs typeface="Courier New" panose="02070309020205020404" pitchFamily="49" charset="0"/>
+              </a:rPr>
+              <a:t>// Create the vector and copy the initial values into it.</a:t>
+            </a:r>
+          </a:p>
+          <a:p>
+            <a:r>
+              <a:rPr lang="en-US" sz="2000" dirty="0">
+                <a:latin typeface="Courier New" panose="02070309020205020404" pitchFamily="49" charset="0"/>
+                <a:cs typeface="Courier New" panose="02070309020205020404" pitchFamily="49" charset="0"/>
+              </a:rPr>
               <a:t>vector&lt;</a:t>
             </a:r>
             <a:r>
@@ -6425,7 +6689,51 @@
                 <a:latin typeface="Courier New" panose="02070309020205020404" pitchFamily="49" charset="0"/>
                 <a:cs typeface="Courier New" panose="02070309020205020404" pitchFamily="49" charset="0"/>
               </a:rPr>
-              <a:t>&gt; primes = { 2, 3, 5, 7, 11, 13, 17, 19, 23, 29 };</a:t>
+              <a:t>&gt; primes( 10 );</a:t>
+            </a:r>
+          </a:p>
+          <a:p>
+            <a:r>
+              <a:rPr lang="en-US" sz="2000" dirty="0" err="1">
+                <a:latin typeface="Courier New" panose="02070309020205020404" pitchFamily="49" charset="0"/>
+                <a:cs typeface="Courier New" panose="02070309020205020404" pitchFamily="49" charset="0"/>
+              </a:rPr>
+              <a:t>primes.insert</a:t>
+            </a:r>
+            <a:r>
+              <a:rPr lang="en-US" sz="2000" dirty="0">
+                <a:latin typeface="Courier New" panose="02070309020205020404" pitchFamily="49" charset="0"/>
+                <a:cs typeface="Courier New" panose="02070309020205020404" pitchFamily="49" charset="0"/>
+              </a:rPr>
+              <a:t>( </a:t>
+            </a:r>
+            <a:r>
+              <a:rPr lang="en-US" sz="2000" dirty="0" err="1">
+                <a:latin typeface="Courier New" panose="02070309020205020404" pitchFamily="49" charset="0"/>
+                <a:cs typeface="Courier New" panose="02070309020205020404" pitchFamily="49" charset="0"/>
+              </a:rPr>
+              <a:t>initial_primes</a:t>
+            </a:r>
+            <a:r>
+              <a:rPr lang="en-US" sz="2000" dirty="0">
+                <a:latin typeface="Courier New" panose="02070309020205020404" pitchFamily="49" charset="0"/>
+                <a:cs typeface="Courier New" panose="02070309020205020404" pitchFamily="49" charset="0"/>
+              </a:rPr>
+              <a:t>, </a:t>
+            </a:r>
+            <a:r>
+              <a:rPr lang="en-US" sz="2000" dirty="0" err="1">
+                <a:latin typeface="Courier New" panose="02070309020205020404" pitchFamily="49" charset="0"/>
+                <a:cs typeface="Courier New" panose="02070309020205020404" pitchFamily="49" charset="0"/>
+              </a:rPr>
+              <a:t>initial_primes</a:t>
+            </a:r>
+            <a:r>
+              <a:rPr lang="en-US" sz="2000" dirty="0">
+                <a:latin typeface="Courier New" panose="02070309020205020404" pitchFamily="49" charset="0"/>
+                <a:cs typeface="Courier New" panose="02070309020205020404" pitchFamily="49" charset="0"/>
+              </a:rPr>
+              <a:t> + 10 );</a:t>
             </a:r>
           </a:p>
         </p:txBody>
@@ -6433,7 +6741,7 @@
     </p:spTree>
     <p:extLst>
       <p:ext uri="{BB962C8B-B14F-4D97-AF65-F5344CB8AC3E}">
-        <p14:creationId xmlns:p14="http://schemas.microsoft.com/office/powerpoint/2010/main" val="1128914069"/>
+        <p14:creationId xmlns:p14="http://schemas.microsoft.com/office/powerpoint/2010/main" val="1741876361"/>
       </p:ext>
     </p:extLst>
   </p:cSld>
@@ -6465,7 +6773,7 @@
           <p:cNvPr id="2" name="Title 1">
             <a:extLst>
               <a:ext uri="{FF2B5EF4-FFF2-40B4-BE49-F238E27FC236}">
-                <a16:creationId xmlns:a16="http://schemas.microsoft.com/office/drawing/2014/main" id="{E8696E2F-8B3B-4A60-8B78-9885BC6FD6BC}"/>
+                <a16:creationId xmlns:a16="http://schemas.microsoft.com/office/drawing/2014/main" id="{1CE6A15F-50FD-4A28-99F8-184F5F1528CD}"/>
               </a:ext>
             </a:extLst>
           </p:cNvPr>
@@ -6483,7 +6791,7 @@
           <a:p>
             <a:r>
               <a:rPr lang="en-US" dirty="0"/>
-              <a:t>There’s More!</a:t>
+              <a:t>C++ 2011 Initializer List Constructors</a:t>
             </a:r>
           </a:p>
         </p:txBody>
@@ -6493,7 +6801,7 @@
           <p:cNvPr id="3" name="Content Placeholder 2">
             <a:extLst>
               <a:ext uri="{FF2B5EF4-FFF2-40B4-BE49-F238E27FC236}">
-                <a16:creationId xmlns:a16="http://schemas.microsoft.com/office/drawing/2014/main" id="{5A5D9DC0-4A1A-4C47-A4E2-B9A879E23BD4}"/>
+                <a16:creationId xmlns:a16="http://schemas.microsoft.com/office/drawing/2014/main" id="{00F5E8A9-86B2-49DD-9E5E-BB90A22C4D1A}"/>
               </a:ext>
             </a:extLst>
           </p:cNvPr>
@@ -6511,7 +6819,59 @@
           <a:p>
             <a:r>
               <a:rPr lang="en-US" dirty="0"/>
-              <a:t>Because of the previous rules, initializer list constructors can also do:</a:t>
+              <a:t>In C++ 2011 this matter is fixed.</a:t>
+            </a:r>
+          </a:p>
+          <a:p>
+            <a:pPr lvl="1"/>
+            <a:r>
+              <a:rPr lang="en-US" dirty="0"/>
+              <a:t>A special “initializer list” class is defined in the library.</a:t>
+            </a:r>
+          </a:p>
+          <a:p>
+            <a:pPr lvl="1"/>
+            <a:r>
+              <a:rPr lang="en-US" dirty="0"/>
+              <a:t>Class designers can provide an “initializer list constructor” that takes an instance of the initializer list class.</a:t>
+            </a:r>
+          </a:p>
+          <a:p>
+            <a:pPr lvl="1"/>
+            <a:r>
+              <a:rPr lang="en-US" dirty="0"/>
+              <a:t>When the compiler sees the programmer using an initializer list, it calls that constructor (if the initializer list constructor does not exist, it is an error).</a:t>
+            </a:r>
+            <a:br>
+              <a:rPr lang="en-US" dirty="0"/>
+            </a:br>
+            <a:br>
+              <a:rPr lang="en-US" dirty="0"/>
+            </a:br>
+            <a:endParaRPr lang="en-US" dirty="0"/>
+          </a:p>
+          <a:p>
+            <a:r>
+              <a:rPr lang="en-US" dirty="0" err="1"/>
+              <a:t>Ahhh</a:t>
+            </a:r>
+            <a:r>
+              <a:rPr lang="en-US" dirty="0"/>
+              <a:t>… much better.</a:t>
+            </a:r>
+          </a:p>
+          <a:p>
+            <a:r>
+              <a:rPr lang="en-US" dirty="0"/>
+              <a:t>All C++ 2011 standard containers do this. </a:t>
+            </a:r>
+            <a:r>
+              <a:rPr lang="en-US" i="1" dirty="0"/>
+              <a:t>You can in your classes too</a:t>
+            </a:r>
+            <a:r>
+              <a:rPr lang="en-US" dirty="0"/>
+              <a:t>!</a:t>
             </a:r>
           </a:p>
         </p:txBody>
@@ -6521,7 +6881,7 @@
           <p:cNvPr id="4" name="TextBox 3">
             <a:extLst>
               <a:ext uri="{FF2B5EF4-FFF2-40B4-BE49-F238E27FC236}">
-                <a16:creationId xmlns:a16="http://schemas.microsoft.com/office/drawing/2014/main" id="{B009598B-9067-4AF5-A744-8838C18DB9F7}"/>
+                <a16:creationId xmlns:a16="http://schemas.microsoft.com/office/drawing/2014/main" id="{F14A1C4C-BDD0-4B92-A486-541C3AC8816C}"/>
               </a:ext>
             </a:extLst>
           </p:cNvPr>
@@ -6530,8 +6890,8 @@
         </p:nvSpPr>
         <p:spPr>
           <a:xfrm>
-            <a:off x="838200" y="2507530"/>
-            <a:ext cx="5423280" cy="2308324"/>
+            <a:off x="838200" y="4326903"/>
+            <a:ext cx="9417963" cy="400110"/>
           </a:xfrm>
           <a:prstGeom prst="rect">
             <a:avLst/>
@@ -6545,126 +6905,33 @@
           <a:lstStyle/>
           <a:p>
             <a:r>
-              <a:rPr lang="en-US" dirty="0">
+              <a:rPr lang="en-US" sz="2000" dirty="0">
                 <a:latin typeface="Courier New" panose="02070309020205020404" pitchFamily="49" charset="0"/>
                 <a:cs typeface="Courier New" panose="02070309020205020404" pitchFamily="49" charset="0"/>
               </a:rPr>
               <a:t>vector&lt;</a:t>
             </a:r>
             <a:r>
-              <a:rPr lang="en-US" b="1" dirty="0">
+              <a:rPr lang="en-US" sz="2000" b="1" dirty="0">
                 <a:latin typeface="Courier New" panose="02070309020205020404" pitchFamily="49" charset="0"/>
                 <a:cs typeface="Courier New" panose="02070309020205020404" pitchFamily="49" charset="0"/>
               </a:rPr>
               <a:t>int</a:t>
             </a:r>
             <a:r>
-              <a:rPr lang="en-US" dirty="0">
-                <a:latin typeface="Courier New" panose="02070309020205020404" pitchFamily="49" charset="0"/>
-                <a:cs typeface="Courier New" panose="02070309020205020404" pitchFamily="49" charset="0"/>
-              </a:rPr>
-              <a:t>&gt; special;</a:t>
-            </a:r>
-          </a:p>
-          <a:p>
-            <a:endParaRPr lang="en-US" dirty="0">
-              <a:latin typeface="Courier New" panose="02070309020205020404" pitchFamily="49" charset="0"/>
-              <a:cs typeface="Courier New" panose="02070309020205020404" pitchFamily="49" charset="0"/>
-            </a:endParaRPr>
-          </a:p>
-          <a:p>
-            <a:r>
-              <a:rPr lang="en-US" dirty="0">
-                <a:latin typeface="Courier New" panose="02070309020205020404" pitchFamily="49" charset="0"/>
-                <a:cs typeface="Courier New" panose="02070309020205020404" pitchFamily="49" charset="0"/>
-              </a:rPr>
-              <a:t>special = { 7, 42, 113 };</a:t>
-            </a:r>
-          </a:p>
-          <a:p>
-            <a:endParaRPr lang="en-US" dirty="0">
-              <a:latin typeface="Courier New" panose="02070309020205020404" pitchFamily="49" charset="0"/>
-              <a:cs typeface="Courier New" panose="02070309020205020404" pitchFamily="49" charset="0"/>
-            </a:endParaRPr>
-          </a:p>
-          <a:p>
-            <a:r>
-              <a:rPr lang="en-US" dirty="0">
-                <a:latin typeface="Courier New" panose="02070309020205020404" pitchFamily="49" charset="0"/>
-                <a:cs typeface="Courier New" panose="02070309020205020404" pitchFamily="49" charset="0"/>
-              </a:rPr>
-              <a:t>// The above is the same as:</a:t>
-            </a:r>
-          </a:p>
-          <a:p>
-            <a:r>
-              <a:rPr lang="en-US" dirty="0">
-                <a:latin typeface="Courier New" panose="02070309020205020404" pitchFamily="49" charset="0"/>
-                <a:cs typeface="Courier New" panose="02070309020205020404" pitchFamily="49" charset="0"/>
-              </a:rPr>
-              <a:t>vector&lt;</a:t>
-            </a:r>
-            <a:r>
-              <a:rPr lang="en-US" b="1" dirty="0">
-                <a:latin typeface="Courier New" panose="02070309020205020404" pitchFamily="49" charset="0"/>
-                <a:cs typeface="Courier New" panose="02070309020205020404" pitchFamily="49" charset="0"/>
-              </a:rPr>
-              <a:t>int</a:t>
-            </a:r>
-            <a:r>
-              <a:rPr lang="en-US" dirty="0">
-                <a:latin typeface="Courier New" panose="02070309020205020404" pitchFamily="49" charset="0"/>
-                <a:cs typeface="Courier New" panose="02070309020205020404" pitchFamily="49" charset="0"/>
-              </a:rPr>
-              <a:t>&gt; </a:t>
-            </a:r>
-            <a:r>
-              <a:rPr lang="en-US" dirty="0" err="1">
-                <a:latin typeface="Courier New" panose="02070309020205020404" pitchFamily="49" charset="0"/>
-                <a:cs typeface="Courier New" panose="02070309020205020404" pitchFamily="49" charset="0"/>
-              </a:rPr>
-              <a:t>t__xyzzy</a:t>
-            </a:r>
-            <a:r>
-              <a:rPr lang="en-US" dirty="0">
-                <a:latin typeface="Courier New" panose="02070309020205020404" pitchFamily="49" charset="0"/>
-                <a:cs typeface="Courier New" panose="02070309020205020404" pitchFamily="49" charset="0"/>
-              </a:rPr>
-              <a:t> = { 7, 42, 113 };</a:t>
-            </a:r>
-          </a:p>
-          <a:p>
-            <a:r>
-              <a:rPr lang="en-US" dirty="0">
-                <a:latin typeface="Courier New" panose="02070309020205020404" pitchFamily="49" charset="0"/>
-                <a:cs typeface="Courier New" panose="02070309020205020404" pitchFamily="49" charset="0"/>
-              </a:rPr>
-              <a:t>special = </a:t>
-            </a:r>
-            <a:r>
-              <a:rPr lang="en-US" dirty="0" err="1">
-                <a:latin typeface="Courier New" panose="02070309020205020404" pitchFamily="49" charset="0"/>
-                <a:cs typeface="Courier New" panose="02070309020205020404" pitchFamily="49" charset="0"/>
-              </a:rPr>
-              <a:t>t__xyzzy</a:t>
-            </a:r>
-            <a:r>
-              <a:rPr lang="en-US" dirty="0">
-                <a:latin typeface="Courier New" panose="02070309020205020404" pitchFamily="49" charset="0"/>
-                <a:cs typeface="Courier New" panose="02070309020205020404" pitchFamily="49" charset="0"/>
-              </a:rPr>
-              <a:t>;</a:t>
-            </a:r>
-          </a:p>
-          <a:p>
-            <a:endParaRPr lang="en-US" dirty="0"/>
+              <a:rPr lang="en-US" sz="2000" dirty="0">
+                <a:latin typeface="Courier New" panose="02070309020205020404" pitchFamily="49" charset="0"/>
+                <a:cs typeface="Courier New" panose="02070309020205020404" pitchFamily="49" charset="0"/>
+              </a:rPr>
+              <a:t>&gt; primes = { 2, 3, 5, 7, 11, 13, 17, 19, 23, 29 };</a:t>
+            </a:r>
           </a:p>
         </p:txBody>
       </p:sp>
     </p:spTree>
     <p:extLst>
       <p:ext uri="{BB962C8B-B14F-4D97-AF65-F5344CB8AC3E}">
-        <p14:creationId xmlns:p14="http://schemas.microsoft.com/office/powerpoint/2010/main" val="3290542387"/>
+        <p14:creationId xmlns:p14="http://schemas.microsoft.com/office/powerpoint/2010/main" val="1128914069"/>
       </p:ext>
     </p:extLst>
   </p:cSld>
@@ -6696,7 +6963,7 @@
           <p:cNvPr id="2" name="Title 1">
             <a:extLst>
               <a:ext uri="{FF2B5EF4-FFF2-40B4-BE49-F238E27FC236}">
-                <a16:creationId xmlns:a16="http://schemas.microsoft.com/office/drawing/2014/main" id="{52E95985-54B2-41F9-8CC3-ECF2C23A50BD}"/>
+                <a16:creationId xmlns:a16="http://schemas.microsoft.com/office/drawing/2014/main" id="{E8696E2F-8B3B-4A60-8B78-9885BC6FD6BC}"/>
               </a:ext>
             </a:extLst>
           </p:cNvPr>
@@ -6714,7 +6981,7 @@
           <a:p>
             <a:r>
               <a:rPr lang="en-US" dirty="0"/>
-              <a:t>And Still More!</a:t>
+              <a:t>There’s More!</a:t>
             </a:r>
           </a:p>
         </p:txBody>
@@ -6724,7 +6991,7 @@
           <p:cNvPr id="3" name="Content Placeholder 2">
             <a:extLst>
               <a:ext uri="{FF2B5EF4-FFF2-40B4-BE49-F238E27FC236}">
-                <a16:creationId xmlns:a16="http://schemas.microsoft.com/office/drawing/2014/main" id="{320F5D6D-8AC1-4DC8-9694-E178EF3C6CAC}"/>
+                <a16:creationId xmlns:a16="http://schemas.microsoft.com/office/drawing/2014/main" id="{5A5D9DC0-4A1A-4C47-A4E2-B9A879E23BD4}"/>
               </a:ext>
             </a:extLst>
           </p:cNvPr>
@@ -6742,7 +7009,7 @@
           <a:p>
             <a:r>
               <a:rPr lang="en-US" dirty="0"/>
-              <a:t>They can also do:</a:t>
+              <a:t>Because of the previous rules, initializer list constructors can also do:</a:t>
             </a:r>
           </a:p>
         </p:txBody>
@@ -6752,7 +7019,7 @@
           <p:cNvPr id="4" name="TextBox 3">
             <a:extLst>
               <a:ext uri="{FF2B5EF4-FFF2-40B4-BE49-F238E27FC236}">
-                <a16:creationId xmlns:a16="http://schemas.microsoft.com/office/drawing/2014/main" id="{CD9F45F1-33DF-417B-BC81-E53E2ED05DDC}"/>
+                <a16:creationId xmlns:a16="http://schemas.microsoft.com/office/drawing/2014/main" id="{B009598B-9067-4AF5-A744-8838C18DB9F7}"/>
               </a:ext>
             </a:extLst>
           </p:cNvPr>
@@ -6762,7 +7029,7 @@
         <p:spPr>
           <a:xfrm>
             <a:off x="838200" y="2507530"/>
-            <a:ext cx="6801862" cy="2308324"/>
+            <a:ext cx="5423280" cy="2308324"/>
           </a:xfrm>
           <a:prstGeom prst="rect">
             <a:avLst/>
@@ -6776,38 +7043,17 @@
           <a:lstStyle/>
           <a:p>
             <a:r>
+              <a:rPr lang="en-US" dirty="0">
+                <a:latin typeface="Courier New" panose="02070309020205020404" pitchFamily="49" charset="0"/>
+                <a:cs typeface="Courier New" panose="02070309020205020404" pitchFamily="49" charset="0"/>
+              </a:rPr>
+              <a:t>vector&lt;</a:t>
+            </a:r>
+            <a:r>
               <a:rPr lang="en-US" b="1" dirty="0">
                 <a:latin typeface="Courier New" panose="02070309020205020404" pitchFamily="49" charset="0"/>
                 <a:cs typeface="Courier New" panose="02070309020205020404" pitchFamily="49" charset="0"/>
               </a:rPr>
-              <a:t>void</a:t>
-            </a:r>
-            <a:r>
-              <a:rPr lang="en-US" dirty="0">
-                <a:latin typeface="Courier New" panose="02070309020205020404" pitchFamily="49" charset="0"/>
-                <a:cs typeface="Courier New" panose="02070309020205020404" pitchFamily="49" charset="0"/>
-              </a:rPr>
-              <a:t> </a:t>
-            </a:r>
-            <a:r>
-              <a:rPr lang="en-US" dirty="0" err="1">
-                <a:latin typeface="Courier New" panose="02070309020205020404" pitchFamily="49" charset="0"/>
-                <a:cs typeface="Courier New" panose="02070309020205020404" pitchFamily="49" charset="0"/>
-              </a:rPr>
-              <a:t>do_something</a:t>
-            </a:r>
-            <a:r>
-              <a:rPr lang="en-US" dirty="0">
-                <a:latin typeface="Courier New" panose="02070309020205020404" pitchFamily="49" charset="0"/>
-                <a:cs typeface="Courier New" panose="02070309020205020404" pitchFamily="49" charset="0"/>
-              </a:rPr>
-              <a:t>( const vector&lt;</a:t>
-            </a:r>
-            <a:r>
-              <a:rPr lang="en-US" b="1" dirty="0">
-                <a:latin typeface="Courier New" panose="02070309020205020404" pitchFamily="49" charset="0"/>
-                <a:cs typeface="Courier New" panose="02070309020205020404" pitchFamily="49" charset="0"/>
-              </a:rPr>
               <a:t>int</a:t>
             </a:r>
             <a:r>
@@ -6815,7 +7061,7 @@
                 <a:latin typeface="Courier New" panose="02070309020205020404" pitchFamily="49" charset="0"/>
                 <a:cs typeface="Courier New" panose="02070309020205020404" pitchFamily="49" charset="0"/>
               </a:rPr>
-              <a:t>&gt; &amp;numbers );</a:t>
+              <a:t>&gt; special;</a:t>
             </a:r>
           </a:p>
           <a:p>
@@ -6826,18 +7072,11 @@
           </a:p>
           <a:p>
             <a:r>
-              <a:rPr lang="en-US" dirty="0" err="1">
-                <a:latin typeface="Courier New" panose="02070309020205020404" pitchFamily="49" charset="0"/>
-                <a:cs typeface="Courier New" panose="02070309020205020404" pitchFamily="49" charset="0"/>
-              </a:rPr>
-              <a:t>do_something</a:t>
-            </a:r>
-            <a:r>
-              <a:rPr lang="en-US" dirty="0">
-                <a:latin typeface="Courier New" panose="02070309020205020404" pitchFamily="49" charset="0"/>
-                <a:cs typeface="Courier New" panose="02070309020205020404" pitchFamily="49" charset="0"/>
-              </a:rPr>
-              <a:t>( { 7, 12, 113 } );</a:t>
+              <a:rPr lang="en-US" dirty="0">
+                <a:latin typeface="Courier New" panose="02070309020205020404" pitchFamily="49" charset="0"/>
+                <a:cs typeface="Courier New" panose="02070309020205020404" pitchFamily="49" charset="0"/>
+              </a:rPr>
+              <a:t>special = { 7, 42, 113 };</a:t>
             </a:r>
           </a:p>
           <a:p>
@@ -6894,24 +7133,17 @@
           </a:p>
           <a:p>
             <a:r>
+              <a:rPr lang="en-US" dirty="0">
+                <a:latin typeface="Courier New" panose="02070309020205020404" pitchFamily="49" charset="0"/>
+                <a:cs typeface="Courier New" panose="02070309020205020404" pitchFamily="49" charset="0"/>
+              </a:rPr>
+              <a:t>special = </a:t>
+            </a:r>
+            <a:r>
               <a:rPr lang="en-US" dirty="0" err="1">
                 <a:latin typeface="Courier New" panose="02070309020205020404" pitchFamily="49" charset="0"/>
                 <a:cs typeface="Courier New" panose="02070309020205020404" pitchFamily="49" charset="0"/>
               </a:rPr>
-              <a:t>do_something</a:t>
-            </a:r>
-            <a:r>
-              <a:rPr lang="en-US" dirty="0">
-                <a:latin typeface="Courier New" panose="02070309020205020404" pitchFamily="49" charset="0"/>
-                <a:cs typeface="Courier New" panose="02070309020205020404" pitchFamily="49" charset="0"/>
-              </a:rPr>
-              <a:t>( </a:t>
-            </a:r>
-            <a:r>
-              <a:rPr lang="en-US" dirty="0" err="1">
-                <a:latin typeface="Courier New" panose="02070309020205020404" pitchFamily="49" charset="0"/>
-                <a:cs typeface="Courier New" panose="02070309020205020404" pitchFamily="49" charset="0"/>
-              </a:rPr>
               <a:t>t__xyzzy</a:t>
             </a:r>
             <a:r>
@@ -6919,7 +7151,7 @@
                 <a:latin typeface="Courier New" panose="02070309020205020404" pitchFamily="49" charset="0"/>
                 <a:cs typeface="Courier New" panose="02070309020205020404" pitchFamily="49" charset="0"/>
               </a:rPr>
-              <a:t> );</a:t>
+              <a:t>;</a:t>
             </a:r>
           </a:p>
           <a:p>
@@ -6930,7 +7162,7 @@
     </p:spTree>
     <p:extLst>
       <p:ext uri="{BB962C8B-B14F-4D97-AF65-F5344CB8AC3E}">
-        <p14:creationId xmlns:p14="http://schemas.microsoft.com/office/powerpoint/2010/main" val="735366978"/>
+        <p14:creationId xmlns:p14="http://schemas.microsoft.com/office/powerpoint/2010/main" val="3290542387"/>
       </p:ext>
     </p:extLst>
   </p:cSld>
@@ -6962,7 +7194,7 @@
           <p:cNvPr id="2" name="Title 1">
             <a:extLst>
               <a:ext uri="{FF2B5EF4-FFF2-40B4-BE49-F238E27FC236}">
-                <a16:creationId xmlns:a16="http://schemas.microsoft.com/office/drawing/2014/main" id="{A47324EF-CEF0-476F-B2DD-2D51EDE8286E}"/>
+                <a16:creationId xmlns:a16="http://schemas.microsoft.com/office/drawing/2014/main" id="{52E95985-54B2-41F9-8CC3-ECF2C23A50BD}"/>
               </a:ext>
             </a:extLst>
           </p:cNvPr>
@@ -6980,7 +7212,7 @@
           <a:p>
             <a:r>
               <a:rPr lang="en-US" dirty="0"/>
-              <a:t>The Uniform Syntax</a:t>
+              <a:t>And Still More!</a:t>
             </a:r>
           </a:p>
         </p:txBody>
@@ -6990,7 +7222,7 @@
           <p:cNvPr id="3" name="Content Placeholder 2">
             <a:extLst>
               <a:ext uri="{FF2B5EF4-FFF2-40B4-BE49-F238E27FC236}">
-                <a16:creationId xmlns:a16="http://schemas.microsoft.com/office/drawing/2014/main" id="{60CF1CA4-F8A8-4BEC-AD7D-5E2100689CDF}"/>
+                <a16:creationId xmlns:a16="http://schemas.microsoft.com/office/drawing/2014/main" id="{320F5D6D-8AC1-4DC8-9694-E178EF3C6CAC}"/>
               </a:ext>
             </a:extLst>
           </p:cNvPr>
@@ -7008,61 +7240,195 @@
           <a:p>
             <a:r>
               <a:rPr lang="en-US" dirty="0"/>
-              <a:t>C++ 2011 also introduced the Uniform Initialization Syntax</a:t>
-            </a:r>
-          </a:p>
-          <a:p>
-            <a:pPr lvl="1"/>
-            <a:r>
-              <a:rPr lang="en-US" dirty="0"/>
-              <a:t>Unifies all forms of initialization into a single syntax.</a:t>
-            </a:r>
-          </a:p>
-          <a:p>
-            <a:pPr lvl="1"/>
-            <a:r>
-              <a:rPr lang="en-US" dirty="0"/>
-              <a:t>Applies stronger (safer) type conversion rules.</a:t>
-            </a:r>
-          </a:p>
-          <a:p>
-            <a:r>
-              <a:rPr lang="en-US" dirty="0"/>
-              <a:t>The uniform syntax is signaled using </a:t>
-            </a:r>
-            <a:r>
-              <a:rPr lang="en-US" i="1" dirty="0"/>
-              <a:t>curly braces, but with </a:t>
-            </a:r>
-            <a:r>
-              <a:rPr lang="en-US" i="1" u="sng" dirty="0"/>
-              <a:t>no equal sign</a:t>
-            </a:r>
-            <a:r>
-              <a:rPr lang="en-US" dirty="0"/>
-              <a:t>.</a:t>
-            </a:r>
-          </a:p>
-          <a:p>
-            <a:pPr lvl="1"/>
-            <a:r>
-              <a:rPr lang="en-US" dirty="0"/>
-              <a:t>It is not at all ambiguous with the older initialization syntaxes.</a:t>
-            </a:r>
-          </a:p>
-          <a:p>
-            <a:pPr lvl="1"/>
-            <a:r>
-              <a:rPr lang="en-US" dirty="0"/>
-              <a:t>Personally, it took me some time to get used to the look!</a:t>
-            </a:r>
+              <a:t>They can also do:</a:t>
+            </a:r>
+          </a:p>
+        </p:txBody>
+      </p:sp>
+      <p:sp>
+        <p:nvSpPr>
+          <p:cNvPr id="4" name="TextBox 3">
+            <a:extLst>
+              <a:ext uri="{FF2B5EF4-FFF2-40B4-BE49-F238E27FC236}">
+                <a16:creationId xmlns:a16="http://schemas.microsoft.com/office/drawing/2014/main" id="{CD9F45F1-33DF-417B-BC81-E53E2ED05DDC}"/>
+              </a:ext>
+            </a:extLst>
+          </p:cNvPr>
+          <p:cNvSpPr txBox="1"/>
+          <p:nvPr/>
+        </p:nvSpPr>
+        <p:spPr>
+          <a:xfrm>
+            <a:off x="838200" y="2507530"/>
+            <a:ext cx="6801862" cy="2308324"/>
+          </a:xfrm>
+          <a:prstGeom prst="rect">
+            <a:avLst/>
+          </a:prstGeom>
+          <a:noFill/>
+        </p:spPr>
+        <p:txBody>
+          <a:bodyPr wrap="none" rtlCol="0">
+            <a:spAutoFit/>
+          </a:bodyPr>
+          <a:lstStyle/>
+          <a:p>
+            <a:r>
+              <a:rPr lang="en-US" b="1" dirty="0">
+                <a:latin typeface="Courier New" panose="02070309020205020404" pitchFamily="49" charset="0"/>
+                <a:cs typeface="Courier New" panose="02070309020205020404" pitchFamily="49" charset="0"/>
+              </a:rPr>
+              <a:t>void</a:t>
+            </a:r>
+            <a:r>
+              <a:rPr lang="en-US" dirty="0">
+                <a:latin typeface="Courier New" panose="02070309020205020404" pitchFamily="49" charset="0"/>
+                <a:cs typeface="Courier New" panose="02070309020205020404" pitchFamily="49" charset="0"/>
+              </a:rPr>
+              <a:t> </a:t>
+            </a:r>
+            <a:r>
+              <a:rPr lang="en-US" dirty="0" err="1">
+                <a:latin typeface="Courier New" panose="02070309020205020404" pitchFamily="49" charset="0"/>
+                <a:cs typeface="Courier New" panose="02070309020205020404" pitchFamily="49" charset="0"/>
+              </a:rPr>
+              <a:t>do_something</a:t>
+            </a:r>
+            <a:r>
+              <a:rPr lang="en-US" dirty="0">
+                <a:latin typeface="Courier New" panose="02070309020205020404" pitchFamily="49" charset="0"/>
+                <a:cs typeface="Courier New" panose="02070309020205020404" pitchFamily="49" charset="0"/>
+              </a:rPr>
+              <a:t>( const vector&lt;</a:t>
+            </a:r>
+            <a:r>
+              <a:rPr lang="en-US" b="1" dirty="0">
+                <a:latin typeface="Courier New" panose="02070309020205020404" pitchFamily="49" charset="0"/>
+                <a:cs typeface="Courier New" panose="02070309020205020404" pitchFamily="49" charset="0"/>
+              </a:rPr>
+              <a:t>int</a:t>
+            </a:r>
+            <a:r>
+              <a:rPr lang="en-US" dirty="0">
+                <a:latin typeface="Courier New" panose="02070309020205020404" pitchFamily="49" charset="0"/>
+                <a:cs typeface="Courier New" panose="02070309020205020404" pitchFamily="49" charset="0"/>
+              </a:rPr>
+              <a:t>&gt; &amp;numbers );</a:t>
+            </a:r>
+          </a:p>
+          <a:p>
+            <a:endParaRPr lang="en-US" dirty="0">
+              <a:latin typeface="Courier New" panose="02070309020205020404" pitchFamily="49" charset="0"/>
+              <a:cs typeface="Courier New" panose="02070309020205020404" pitchFamily="49" charset="0"/>
+            </a:endParaRPr>
+          </a:p>
+          <a:p>
+            <a:r>
+              <a:rPr lang="en-US" dirty="0" err="1">
+                <a:latin typeface="Courier New" panose="02070309020205020404" pitchFamily="49" charset="0"/>
+                <a:cs typeface="Courier New" panose="02070309020205020404" pitchFamily="49" charset="0"/>
+              </a:rPr>
+              <a:t>do_something</a:t>
+            </a:r>
+            <a:r>
+              <a:rPr lang="en-US" dirty="0">
+                <a:latin typeface="Courier New" panose="02070309020205020404" pitchFamily="49" charset="0"/>
+                <a:cs typeface="Courier New" panose="02070309020205020404" pitchFamily="49" charset="0"/>
+              </a:rPr>
+              <a:t>( { 7, 12, 113 } );</a:t>
+            </a:r>
+          </a:p>
+          <a:p>
+            <a:endParaRPr lang="en-US" dirty="0">
+              <a:latin typeface="Courier New" panose="02070309020205020404" pitchFamily="49" charset="0"/>
+              <a:cs typeface="Courier New" panose="02070309020205020404" pitchFamily="49" charset="0"/>
+            </a:endParaRPr>
+          </a:p>
+          <a:p>
+            <a:r>
+              <a:rPr lang="en-US" dirty="0">
+                <a:latin typeface="Courier New" panose="02070309020205020404" pitchFamily="49" charset="0"/>
+                <a:cs typeface="Courier New" panose="02070309020205020404" pitchFamily="49" charset="0"/>
+              </a:rPr>
+              <a:t>// The above is the same as:</a:t>
+            </a:r>
+          </a:p>
+          <a:p>
+            <a:r>
+              <a:rPr lang="en-US" dirty="0">
+                <a:latin typeface="Courier New" panose="02070309020205020404" pitchFamily="49" charset="0"/>
+                <a:cs typeface="Courier New" panose="02070309020205020404" pitchFamily="49" charset="0"/>
+              </a:rPr>
+              <a:t>vector&lt;</a:t>
+            </a:r>
+            <a:r>
+              <a:rPr lang="en-US" b="1" dirty="0">
+                <a:latin typeface="Courier New" panose="02070309020205020404" pitchFamily="49" charset="0"/>
+                <a:cs typeface="Courier New" panose="02070309020205020404" pitchFamily="49" charset="0"/>
+              </a:rPr>
+              <a:t>int</a:t>
+            </a:r>
+            <a:r>
+              <a:rPr lang="en-US" dirty="0">
+                <a:latin typeface="Courier New" panose="02070309020205020404" pitchFamily="49" charset="0"/>
+                <a:cs typeface="Courier New" panose="02070309020205020404" pitchFamily="49" charset="0"/>
+              </a:rPr>
+              <a:t>&gt; </a:t>
+            </a:r>
+            <a:r>
+              <a:rPr lang="en-US" dirty="0" err="1">
+                <a:latin typeface="Courier New" panose="02070309020205020404" pitchFamily="49" charset="0"/>
+                <a:cs typeface="Courier New" panose="02070309020205020404" pitchFamily="49" charset="0"/>
+              </a:rPr>
+              <a:t>t__xyzzy</a:t>
+            </a:r>
+            <a:r>
+              <a:rPr lang="en-US" dirty="0">
+                <a:latin typeface="Courier New" panose="02070309020205020404" pitchFamily="49" charset="0"/>
+                <a:cs typeface="Courier New" panose="02070309020205020404" pitchFamily="49" charset="0"/>
+              </a:rPr>
+              <a:t> = { 7, 42, 113 };</a:t>
+            </a:r>
+          </a:p>
+          <a:p>
+            <a:r>
+              <a:rPr lang="en-US" dirty="0" err="1">
+                <a:latin typeface="Courier New" panose="02070309020205020404" pitchFamily="49" charset="0"/>
+                <a:cs typeface="Courier New" panose="02070309020205020404" pitchFamily="49" charset="0"/>
+              </a:rPr>
+              <a:t>do_something</a:t>
+            </a:r>
+            <a:r>
+              <a:rPr lang="en-US" dirty="0">
+                <a:latin typeface="Courier New" panose="02070309020205020404" pitchFamily="49" charset="0"/>
+                <a:cs typeface="Courier New" panose="02070309020205020404" pitchFamily="49" charset="0"/>
+              </a:rPr>
+              <a:t>( </a:t>
+            </a:r>
+            <a:r>
+              <a:rPr lang="en-US" dirty="0" err="1">
+                <a:latin typeface="Courier New" panose="02070309020205020404" pitchFamily="49" charset="0"/>
+                <a:cs typeface="Courier New" panose="02070309020205020404" pitchFamily="49" charset="0"/>
+              </a:rPr>
+              <a:t>t__xyzzy</a:t>
+            </a:r>
+            <a:r>
+              <a:rPr lang="en-US" dirty="0">
+                <a:latin typeface="Courier New" panose="02070309020205020404" pitchFamily="49" charset="0"/>
+                <a:cs typeface="Courier New" panose="02070309020205020404" pitchFamily="49" charset="0"/>
+              </a:rPr>
+              <a:t> );</a:t>
+            </a:r>
+          </a:p>
+          <a:p>
+            <a:endParaRPr lang="en-US" dirty="0"/>
           </a:p>
         </p:txBody>
       </p:sp>
     </p:spTree>
     <p:extLst>
       <p:ext uri="{BB962C8B-B14F-4D97-AF65-F5344CB8AC3E}">
-        <p14:creationId xmlns:p14="http://schemas.microsoft.com/office/powerpoint/2010/main" val="382263601"/>
+        <p14:creationId xmlns:p14="http://schemas.microsoft.com/office/powerpoint/2010/main" val="735366978"/>
       </p:ext>
     </p:extLst>
   </p:cSld>
@@ -7094,7 +7460,7 @@
           <p:cNvPr id="2" name="Title 1">
             <a:extLst>
               <a:ext uri="{FF2B5EF4-FFF2-40B4-BE49-F238E27FC236}">
-                <a16:creationId xmlns:a16="http://schemas.microsoft.com/office/drawing/2014/main" id="{F3ED23EE-8BA0-4F3F-A632-843B45622E72}"/>
+                <a16:creationId xmlns:a16="http://schemas.microsoft.com/office/drawing/2014/main" id="{A47324EF-CEF0-476F-B2DD-2D51EDE8286E}"/>
               </a:ext>
             </a:extLst>
           </p:cNvPr>
@@ -7112,147 +7478,81 @@
           <a:p>
             <a:r>
               <a:rPr lang="en-US" dirty="0"/>
-              <a:t>The Uniform Syntax in Action</a:t>
-            </a:r>
-          </a:p>
-        </p:txBody>
-      </p:sp>
-      <p:sp>
-        <p:nvSpPr>
-          <p:cNvPr id="4" name="TextBox 3">
-            <a:extLst>
-              <a:ext uri="{FF2B5EF4-FFF2-40B4-BE49-F238E27FC236}">
-                <a16:creationId xmlns:a16="http://schemas.microsoft.com/office/drawing/2014/main" id="{0B76C30D-E527-45BB-8DC0-A46C9B1478CC}"/>
-              </a:ext>
-            </a:extLst>
-          </p:cNvPr>
-          <p:cNvSpPr txBox="1"/>
-          <p:nvPr/>
-        </p:nvSpPr>
-        <p:spPr>
-          <a:xfrm>
-            <a:off x="838200" y="1690688"/>
-            <a:ext cx="8042586" cy="3139321"/>
-          </a:xfrm>
-          <a:prstGeom prst="rect">
-            <a:avLst/>
-          </a:prstGeom>
-          <a:noFill/>
-        </p:spPr>
-        <p:txBody>
-          <a:bodyPr wrap="none" rtlCol="0">
-            <a:spAutoFit/>
-          </a:bodyPr>
-          <a:lstStyle/>
-          <a:p>
-            <a:r>
-              <a:rPr lang="en-US" dirty="0">
-                <a:latin typeface="Courier New" panose="02070309020205020404" pitchFamily="49" charset="0"/>
-                <a:cs typeface="Courier New" panose="02070309020205020404" pitchFamily="49" charset="0"/>
-              </a:rPr>
-              <a:t>// Simple, scalar initialization (like in C).</a:t>
-            </a:r>
-          </a:p>
-          <a:p>
-            <a:r>
-              <a:rPr lang="en-US" b="1" dirty="0">
-                <a:latin typeface="Courier New" panose="02070309020205020404" pitchFamily="49" charset="0"/>
-                <a:cs typeface="Courier New" panose="02070309020205020404" pitchFamily="49" charset="0"/>
-              </a:rPr>
-              <a:t>int</a:t>
-            </a:r>
-            <a:r>
-              <a:rPr lang="en-US" dirty="0">
-                <a:latin typeface="Courier New" panose="02070309020205020404" pitchFamily="49" charset="0"/>
-                <a:cs typeface="Courier New" panose="02070309020205020404" pitchFamily="49" charset="0"/>
-              </a:rPr>
-              <a:t> x{ 42 };</a:t>
-            </a:r>
-          </a:p>
-          <a:p>
-            <a:endParaRPr lang="en-US" dirty="0">
-              <a:latin typeface="Courier New" panose="02070309020205020404" pitchFamily="49" charset="0"/>
-              <a:cs typeface="Courier New" panose="02070309020205020404" pitchFamily="49" charset="0"/>
-            </a:endParaRPr>
-          </a:p>
-          <a:p>
-            <a:r>
-              <a:rPr lang="en-US" dirty="0">
-                <a:latin typeface="Courier New" panose="02070309020205020404" pitchFamily="49" charset="0"/>
-                <a:cs typeface="Courier New" panose="02070309020205020404" pitchFamily="49" charset="0"/>
-              </a:rPr>
-              <a:t>// Call constructor taking const char * parameter.</a:t>
-            </a:r>
-          </a:p>
-          <a:p>
-            <a:r>
-              <a:rPr lang="en-US" dirty="0">
-                <a:latin typeface="Courier New" panose="02070309020205020404" pitchFamily="49" charset="0"/>
-                <a:cs typeface="Courier New" panose="02070309020205020404" pitchFamily="49" charset="0"/>
-              </a:rPr>
-              <a:t>string name{ “Jill” };</a:t>
-            </a:r>
-          </a:p>
-          <a:p>
-            <a:endParaRPr lang="en-US" dirty="0">
-              <a:latin typeface="Courier New" panose="02070309020205020404" pitchFamily="49" charset="0"/>
-              <a:cs typeface="Courier New" panose="02070309020205020404" pitchFamily="49" charset="0"/>
-            </a:endParaRPr>
-          </a:p>
-          <a:p>
-            <a:r>
-              <a:rPr lang="en-US" dirty="0">
-                <a:latin typeface="Courier New" panose="02070309020205020404" pitchFamily="49" charset="0"/>
-                <a:cs typeface="Courier New" panose="02070309020205020404" pitchFamily="49" charset="0"/>
-              </a:rPr>
-              <a:t>// Call constructor taking two parameters.</a:t>
-            </a:r>
-          </a:p>
-          <a:p>
-            <a:r>
-              <a:rPr lang="en-US" dirty="0">
-                <a:latin typeface="Courier New" panose="02070309020205020404" pitchFamily="49" charset="0"/>
-                <a:cs typeface="Courier New" panose="02070309020205020404" pitchFamily="49" charset="0"/>
-              </a:rPr>
-              <a:t>string separator{ 64, ‘*’ };</a:t>
-            </a:r>
-          </a:p>
-          <a:p>
-            <a:endParaRPr lang="en-US" dirty="0">
-              <a:latin typeface="Courier New" panose="02070309020205020404" pitchFamily="49" charset="0"/>
-              <a:cs typeface="Courier New" panose="02070309020205020404" pitchFamily="49" charset="0"/>
-            </a:endParaRPr>
-          </a:p>
-          <a:p>
-            <a:r>
-              <a:rPr lang="en-US" dirty="0">
-                <a:latin typeface="Courier New" panose="02070309020205020404" pitchFamily="49" charset="0"/>
-                <a:cs typeface="Courier New" panose="02070309020205020404" pitchFamily="49" charset="0"/>
-              </a:rPr>
-              <a:t>// Call the initializer list constructor.</a:t>
-            </a:r>
-          </a:p>
-          <a:p>
-            <a:r>
-              <a:rPr lang="en-US" dirty="0">
-                <a:latin typeface="Courier New" panose="02070309020205020404" pitchFamily="49" charset="0"/>
-                <a:cs typeface="Courier New" panose="02070309020205020404" pitchFamily="49" charset="0"/>
-              </a:rPr>
-              <a:t>vector&lt;</a:t>
-            </a:r>
-            <a:r>
-              <a:rPr lang="en-US" b="1" dirty="0">
-                <a:latin typeface="Courier New" panose="02070309020205020404" pitchFamily="49" charset="0"/>
-                <a:cs typeface="Courier New" panose="02070309020205020404" pitchFamily="49" charset="0"/>
-              </a:rPr>
-              <a:t>int</a:t>
-            </a:r>
-            <a:r>
-              <a:rPr lang="en-US" dirty="0">
-                <a:latin typeface="Courier New" panose="02070309020205020404" pitchFamily="49" charset="0"/>
-                <a:cs typeface="Courier New" panose="02070309020205020404" pitchFamily="49" charset="0"/>
-              </a:rPr>
-              <a:t>&gt; primes{ 2, 3, 5, 7, 11, 13, 17, 19, 23, 29 };</a:t>
+              <a:t>The Uniform Syntax</a:t>
+            </a:r>
+          </a:p>
+        </p:txBody>
+      </p:sp>
+      <p:sp>
+        <p:nvSpPr>
+          <p:cNvPr id="3" name="Content Placeholder 2">
+            <a:extLst>
+              <a:ext uri="{FF2B5EF4-FFF2-40B4-BE49-F238E27FC236}">
+                <a16:creationId xmlns:a16="http://schemas.microsoft.com/office/drawing/2014/main" id="{60CF1CA4-F8A8-4BEC-AD7D-5E2100689CDF}"/>
+              </a:ext>
+            </a:extLst>
+          </p:cNvPr>
+          <p:cNvSpPr>
+            <a:spLocks noGrp="1"/>
+          </p:cNvSpPr>
+          <p:nvPr>
+            <p:ph idx="1"/>
+          </p:nvPr>
+        </p:nvSpPr>
+        <p:spPr/>
+        <p:txBody>
+          <a:bodyPr/>
+          <a:lstStyle/>
+          <a:p>
+            <a:r>
+              <a:rPr lang="en-US" dirty="0"/>
+              <a:t>C++ 2011 also introduced the Uniform Initialization Syntax</a:t>
+            </a:r>
+          </a:p>
+          <a:p>
+            <a:pPr lvl="1"/>
+            <a:r>
+              <a:rPr lang="en-US" dirty="0"/>
+              <a:t>Unifies all forms of initialization into a single syntax.</a:t>
+            </a:r>
+          </a:p>
+          <a:p>
+            <a:pPr lvl="1"/>
+            <a:r>
+              <a:rPr lang="en-US" dirty="0"/>
+              <a:t>Applies stronger (safer) type conversion rules.</a:t>
+            </a:r>
+          </a:p>
+          <a:p>
+            <a:r>
+              <a:rPr lang="en-US" dirty="0"/>
+              <a:t>The uniform syntax is signaled using </a:t>
+            </a:r>
+            <a:r>
+              <a:rPr lang="en-US" i="1" dirty="0"/>
+              <a:t>curly braces, but with </a:t>
+            </a:r>
+            <a:r>
+              <a:rPr lang="en-US" i="1" u="sng" dirty="0"/>
+              <a:t>no equal sign</a:t>
+            </a:r>
+            <a:r>
+              <a:rPr lang="en-US" dirty="0"/>
+              <a:t>.</a:t>
+            </a:r>
+          </a:p>
+          <a:p>
+            <a:pPr lvl="1"/>
+            <a:r>
+              <a:rPr lang="en-US" dirty="0"/>
+              <a:t>It is not at all ambiguous with the older initialization syntaxes.</a:t>
+            </a:r>
+          </a:p>
+          <a:p>
+            <a:pPr lvl="1"/>
+            <a:r>
+              <a:rPr lang="en-US" dirty="0"/>
+              <a:t>Personally, it took me some time to get used to the look!</a:t>
             </a:r>
           </a:p>
         </p:txBody>
@@ -7260,7 +7560,7 @@
     </p:spTree>
     <p:extLst>
       <p:ext uri="{BB962C8B-B14F-4D97-AF65-F5344CB8AC3E}">
-        <p14:creationId xmlns:p14="http://schemas.microsoft.com/office/powerpoint/2010/main" val="3804688758"/>
+        <p14:creationId xmlns:p14="http://schemas.microsoft.com/office/powerpoint/2010/main" val="382263601"/>
       </p:ext>
     </p:extLst>
   </p:cSld>
@@ -7289,6 +7589,204 @@
       </p:grpSpPr>
       <p:sp>
         <p:nvSpPr>
+          <p:cNvPr id="2" name="Title 1">
+            <a:extLst>
+              <a:ext uri="{FF2B5EF4-FFF2-40B4-BE49-F238E27FC236}">
+                <a16:creationId xmlns:a16="http://schemas.microsoft.com/office/drawing/2014/main" id="{F3ED23EE-8BA0-4F3F-A632-843B45622E72}"/>
+              </a:ext>
+            </a:extLst>
+          </p:cNvPr>
+          <p:cNvSpPr>
+            <a:spLocks noGrp="1"/>
+          </p:cNvSpPr>
+          <p:nvPr>
+            <p:ph type="title"/>
+          </p:nvPr>
+        </p:nvSpPr>
+        <p:spPr/>
+        <p:txBody>
+          <a:bodyPr/>
+          <a:lstStyle/>
+          <a:p>
+            <a:r>
+              <a:rPr lang="en-US" dirty="0"/>
+              <a:t>The Uniform Syntax in Action</a:t>
+            </a:r>
+          </a:p>
+        </p:txBody>
+      </p:sp>
+      <p:sp>
+        <p:nvSpPr>
+          <p:cNvPr id="4" name="TextBox 3">
+            <a:extLst>
+              <a:ext uri="{FF2B5EF4-FFF2-40B4-BE49-F238E27FC236}">
+                <a16:creationId xmlns:a16="http://schemas.microsoft.com/office/drawing/2014/main" id="{0B76C30D-E527-45BB-8DC0-A46C9B1478CC}"/>
+              </a:ext>
+            </a:extLst>
+          </p:cNvPr>
+          <p:cNvSpPr txBox="1"/>
+          <p:nvPr/>
+        </p:nvSpPr>
+        <p:spPr>
+          <a:xfrm>
+            <a:off x="838200" y="1690688"/>
+            <a:ext cx="8042586" cy="3139321"/>
+          </a:xfrm>
+          <a:prstGeom prst="rect">
+            <a:avLst/>
+          </a:prstGeom>
+          <a:noFill/>
+        </p:spPr>
+        <p:txBody>
+          <a:bodyPr wrap="none" rtlCol="0">
+            <a:spAutoFit/>
+          </a:bodyPr>
+          <a:lstStyle/>
+          <a:p>
+            <a:r>
+              <a:rPr lang="en-US" dirty="0">
+                <a:latin typeface="Courier New" panose="02070309020205020404" pitchFamily="49" charset="0"/>
+                <a:cs typeface="Courier New" panose="02070309020205020404" pitchFamily="49" charset="0"/>
+              </a:rPr>
+              <a:t>// Simple, scalar initialization (like in C).</a:t>
+            </a:r>
+          </a:p>
+          <a:p>
+            <a:r>
+              <a:rPr lang="en-US" b="1" dirty="0">
+                <a:latin typeface="Courier New" panose="02070309020205020404" pitchFamily="49" charset="0"/>
+                <a:cs typeface="Courier New" panose="02070309020205020404" pitchFamily="49" charset="0"/>
+              </a:rPr>
+              <a:t>int</a:t>
+            </a:r>
+            <a:r>
+              <a:rPr lang="en-US" dirty="0">
+                <a:latin typeface="Courier New" panose="02070309020205020404" pitchFamily="49" charset="0"/>
+                <a:cs typeface="Courier New" panose="02070309020205020404" pitchFamily="49" charset="0"/>
+              </a:rPr>
+              <a:t> x{ 42 };</a:t>
+            </a:r>
+          </a:p>
+          <a:p>
+            <a:endParaRPr lang="en-US" dirty="0">
+              <a:latin typeface="Courier New" panose="02070309020205020404" pitchFamily="49" charset="0"/>
+              <a:cs typeface="Courier New" panose="02070309020205020404" pitchFamily="49" charset="0"/>
+            </a:endParaRPr>
+          </a:p>
+          <a:p>
+            <a:r>
+              <a:rPr lang="en-US" dirty="0">
+                <a:latin typeface="Courier New" panose="02070309020205020404" pitchFamily="49" charset="0"/>
+                <a:cs typeface="Courier New" panose="02070309020205020404" pitchFamily="49" charset="0"/>
+              </a:rPr>
+              <a:t>// Call constructor taking const char * parameter.</a:t>
+            </a:r>
+          </a:p>
+          <a:p>
+            <a:r>
+              <a:rPr lang="en-US" dirty="0">
+                <a:latin typeface="Courier New" panose="02070309020205020404" pitchFamily="49" charset="0"/>
+                <a:cs typeface="Courier New" panose="02070309020205020404" pitchFamily="49" charset="0"/>
+              </a:rPr>
+              <a:t>string name{ “Jill” };</a:t>
+            </a:r>
+          </a:p>
+          <a:p>
+            <a:endParaRPr lang="en-US" dirty="0">
+              <a:latin typeface="Courier New" panose="02070309020205020404" pitchFamily="49" charset="0"/>
+              <a:cs typeface="Courier New" panose="02070309020205020404" pitchFamily="49" charset="0"/>
+            </a:endParaRPr>
+          </a:p>
+          <a:p>
+            <a:r>
+              <a:rPr lang="en-US" dirty="0">
+                <a:latin typeface="Courier New" panose="02070309020205020404" pitchFamily="49" charset="0"/>
+                <a:cs typeface="Courier New" panose="02070309020205020404" pitchFamily="49" charset="0"/>
+              </a:rPr>
+              <a:t>// Call constructor taking two parameters.</a:t>
+            </a:r>
+          </a:p>
+          <a:p>
+            <a:r>
+              <a:rPr lang="en-US" dirty="0">
+                <a:latin typeface="Courier New" panose="02070309020205020404" pitchFamily="49" charset="0"/>
+                <a:cs typeface="Courier New" panose="02070309020205020404" pitchFamily="49" charset="0"/>
+              </a:rPr>
+              <a:t>string separator{ 64, ‘*’ };</a:t>
+            </a:r>
+          </a:p>
+          <a:p>
+            <a:endParaRPr lang="en-US" dirty="0">
+              <a:latin typeface="Courier New" panose="02070309020205020404" pitchFamily="49" charset="0"/>
+              <a:cs typeface="Courier New" panose="02070309020205020404" pitchFamily="49" charset="0"/>
+            </a:endParaRPr>
+          </a:p>
+          <a:p>
+            <a:r>
+              <a:rPr lang="en-US" dirty="0">
+                <a:latin typeface="Courier New" panose="02070309020205020404" pitchFamily="49" charset="0"/>
+                <a:cs typeface="Courier New" panose="02070309020205020404" pitchFamily="49" charset="0"/>
+              </a:rPr>
+              <a:t>// Call the initializer list constructor.</a:t>
+            </a:r>
+          </a:p>
+          <a:p>
+            <a:r>
+              <a:rPr lang="en-US" dirty="0">
+                <a:latin typeface="Courier New" panose="02070309020205020404" pitchFamily="49" charset="0"/>
+                <a:cs typeface="Courier New" panose="02070309020205020404" pitchFamily="49" charset="0"/>
+              </a:rPr>
+              <a:t>vector&lt;</a:t>
+            </a:r>
+            <a:r>
+              <a:rPr lang="en-US" b="1" dirty="0">
+                <a:latin typeface="Courier New" panose="02070309020205020404" pitchFamily="49" charset="0"/>
+                <a:cs typeface="Courier New" panose="02070309020205020404" pitchFamily="49" charset="0"/>
+              </a:rPr>
+              <a:t>int</a:t>
+            </a:r>
+            <a:r>
+              <a:rPr lang="en-US" dirty="0">
+                <a:latin typeface="Courier New" panose="02070309020205020404" pitchFamily="49" charset="0"/>
+                <a:cs typeface="Courier New" panose="02070309020205020404" pitchFamily="49" charset="0"/>
+              </a:rPr>
+              <a:t>&gt; primes{ 2, 3, 5, 7, 11, 13, 17, 19, 23, 29 };</a:t>
+            </a:r>
+          </a:p>
+        </p:txBody>
+      </p:sp>
+    </p:spTree>
+    <p:extLst>
+      <p:ext uri="{BB962C8B-B14F-4D97-AF65-F5344CB8AC3E}">
+        <p14:creationId xmlns:p14="http://schemas.microsoft.com/office/powerpoint/2010/main" val="3804688758"/>
+      </p:ext>
+    </p:extLst>
+  </p:cSld>
+  <p:clrMapOvr>
+    <a:masterClrMapping/>
+  </p:clrMapOvr>
+</p:sld>
+</file>
+
+<file path=ppt/slides/slide27.xml><?xml version="1.0" encoding="utf-8"?>
+<p:sld xmlns:a="http://schemas.openxmlformats.org/drawingml/2006/main" xmlns:r="http://schemas.openxmlformats.org/officeDocument/2006/relationships" xmlns:p="http://schemas.openxmlformats.org/presentationml/2006/main">
+  <p:cSld>
+    <p:spTree>
+      <p:nvGrpSpPr>
+        <p:cNvPr id="1" name=""/>
+        <p:cNvGrpSpPr/>
+        <p:nvPr/>
+      </p:nvGrpSpPr>
+      <p:grpSpPr>
+        <a:xfrm>
+          <a:off x="0" y="0"/>
+          <a:ext cx="0" cy="0"/>
+          <a:chOff x="0" y="0"/>
+          <a:chExt cx="0" cy="0"/>
+        </a:xfrm>
+      </p:grpSpPr>
+      <p:sp>
+        <p:nvSpPr>
           <p:cNvPr id="4" name="Title 3">
             <a:extLst>
               <a:ext uri="{FF2B5EF4-FFF2-40B4-BE49-F238E27FC236}">
@@ -7379,8 +7877,12 @@
           <a:p>
             <a:pPr lvl="1"/>
             <a:r>
-              <a:rPr lang="en-US" dirty="0"/>
-              <a:t>It is an initializer list with one initializer.</a:t>
+              <a:rPr lang="en-US" u="sng" dirty="0"/>
+              <a:t>It is an initializer list with one initializer</a:t>
+            </a:r>
+            <a:r>
+              <a:rPr lang="en-US" dirty="0"/>
+              <a:t>.</a:t>
             </a:r>
           </a:p>
           <a:p>
@@ -7394,7 +7896,15 @@
             <a:pPr lvl="1"/>
             <a:r>
               <a:rPr lang="en-US" dirty="0"/>
-              <a:t>The problem only arises because it’s a vector of integers. A vector of strings doesn’t have this ambiguity: numbers{ 10 } can only be specifying the size.</a:t>
+              <a:t>The problem only arises because it’s a vector of </a:t>
+            </a:r>
+            <a:r>
+              <a:rPr lang="en-US" i="1" dirty="0"/>
+              <a:t>integers</a:t>
+            </a:r>
+            <a:r>
+              <a:rPr lang="en-US" dirty="0"/>
+              <a:t>. A vector of strings doesn’t have this ambiguity: strings{ 10 } can only be specifying the size.</a:t>
             </a:r>
           </a:p>
         </p:txBody>
@@ -7464,7 +7974,7 @@
 </p:sld>
 </file>
 
-<file path=ppt/slides/slide27.xml><?xml version="1.0" encoding="utf-8"?>
+<file path=ppt/slides/slide28.xml><?xml version="1.0" encoding="utf-8"?>
 <p:sld xmlns:a="http://schemas.openxmlformats.org/drawingml/2006/main" xmlns:r="http://schemas.openxmlformats.org/officeDocument/2006/relationships" xmlns:p="http://schemas.openxmlformats.org/presentationml/2006/main">
   <p:cSld>
     <p:spTree>
@@ -8366,8 +8876,8 @@
         </p:nvSpPr>
         <p:spPr>
           <a:xfrm>
-            <a:off x="1319752" y="3220026"/>
-            <a:ext cx="4496167" cy="369332"/>
+            <a:off x="2488281" y="3220026"/>
+            <a:ext cx="6368025" cy="369332"/>
           </a:xfrm>
           <a:prstGeom prst="rect">
             <a:avLst/>
@@ -8382,7 +8892,7 @@
           <a:p>
             <a:r>
               <a:rPr lang="en-US" dirty="0"/>
-              <a:t>Structure definition (typically in a header file).</a:t>
+              <a:t>Structure definition (typically, but not necessarily, in a header file).</a:t>
             </a:r>
           </a:p>
         </p:txBody>
@@ -8401,7 +8911,7 @@
         </p:nvSpPr>
         <p:spPr>
           <a:xfrm>
-            <a:off x="1319752" y="4278293"/>
+            <a:off x="2488281" y="4287024"/>
             <a:ext cx="8209683" cy="369332"/>
           </a:xfrm>
           <a:prstGeom prst="rect">

</xml_diff>